<commit_message>
Update log Lightning fi-FI
</commit_message>
<xml_diff>
--- a/logo lightning network fi-FI/bitcoin logo lightning network fi-FI.pptx
+++ b/logo lightning network fi-FI/bitcoin logo lightning network fi-FI.pptx
@@ -5,7 +5,7 @@
     <p:sldMasterId id="2147483672" r:id="rId1"/>
   </p:sldMasterIdLst>
   <p:sldIdLst>
-    <p:sldId id="256" r:id="rId2"/>
+    <p:sldId id="263" r:id="rId2"/>
   </p:sldIdLst>
   <p:sldSz cx="9720263" cy="3240088"/>
   <p:notesSz cx="6858000" cy="9144000"/>
@@ -115,8 +115,7 @@
 <file path=ppt/revisionInfo.xml><?xml version="1.0" encoding="utf-8"?>
 <p1510:revInfo xmlns:a="http://schemas.openxmlformats.org/drawingml/2006/main" xmlns:r="http://schemas.openxmlformats.org/officeDocument/2006/relationships" xmlns:p1510="http://schemas.microsoft.com/office/powerpoint/2015/10/main">
   <p1510:revLst>
-    <p1510:client id="{3A57CA03-FE34-4A8E-A273-5AD7ABDF0FFB}" v="458" dt="2024-03-08T22:01:29.377"/>
-    <p1510:client id="{4ED1C821-59B5-4C36-800E-36BF6E3A404E}" v="19" dt="2024-03-09T04:13:07.696"/>
+    <p1510:client id="{4B49EF1C-EBB3-4E83-9F51-0353B7CA028B}" v="4" dt="2024-03-15T20:11:16.418"/>
   </p1510:revLst>
 </p1510:revInfo>
 </file>
@@ -124,586 +123,42 @@
 <file path=ppt/changesInfos/changesInfo1.xml><?xml version="1.0" encoding="utf-8"?>
 <pc:chgInfo xmlns:a="http://schemas.openxmlformats.org/drawingml/2006/main" xmlns:r="http://schemas.openxmlformats.org/officeDocument/2006/relationships" xmlns:ac="http://schemas.microsoft.com/office/drawing/2013/main/command" xmlns:pc="http://schemas.microsoft.com/office/powerpoint/2013/main/command">
   <pc:docChgLst>
-    <pc:chgData name="Tomi Lind" userId="73fe6e1701840021" providerId="LiveId" clId="{4ED1C821-59B5-4C36-800E-36BF6E3A404E}"/>
-    <pc:docChg chg="undo custSel modSld">
-      <pc:chgData name="Tomi Lind" userId="73fe6e1701840021" providerId="LiveId" clId="{4ED1C821-59B5-4C36-800E-36BF6E3A404E}" dt="2024-03-09T04:13:29.057" v="49" actId="14100"/>
+    <pc:chgData name="Tomi Lind" userId="73fe6e1701840021" providerId="LiveId" clId="{4B49EF1C-EBB3-4E83-9F51-0353B7CA028B}"/>
+    <pc:docChg chg="undo redo custSel modSld">
+      <pc:chgData name="Tomi Lind" userId="73fe6e1701840021" providerId="LiveId" clId="{4B49EF1C-EBB3-4E83-9F51-0353B7CA028B}" dt="2024-03-15T20:11:19.673" v="22" actId="255"/>
       <pc:docMkLst>
         <pc:docMk/>
       </pc:docMkLst>
-      <pc:sldChg chg="addSp delSp modSp mod">
-        <pc:chgData name="Tomi Lind" userId="73fe6e1701840021" providerId="LiveId" clId="{4ED1C821-59B5-4C36-800E-36BF6E3A404E}" dt="2024-03-09T04:13:29.057" v="49" actId="14100"/>
+      <pc:sldChg chg="modSp mod">
+        <pc:chgData name="Tomi Lind" userId="73fe6e1701840021" providerId="LiveId" clId="{4B49EF1C-EBB3-4E83-9F51-0353B7CA028B}" dt="2024-03-15T20:11:19.673" v="22" actId="255"/>
         <pc:sldMkLst>
           <pc:docMk/>
-          <pc:sldMk cId="560821162" sldId="256"/>
+          <pc:sldMk cId="110841472" sldId="263"/>
         </pc:sldMkLst>
         <pc:spChg chg="mod">
-          <ac:chgData name="Tomi Lind" userId="73fe6e1701840021" providerId="LiveId" clId="{4ED1C821-59B5-4C36-800E-36BF6E3A404E}" dt="2024-03-09T04:10:14.711" v="10" actId="1076"/>
+          <ac:chgData name="Tomi Lind" userId="73fe6e1701840021" providerId="LiveId" clId="{4B49EF1C-EBB3-4E83-9F51-0353B7CA028B}" dt="2024-03-15T20:11:16.418" v="20" actId="14100"/>
           <ac:spMkLst>
             <pc:docMk/>
-            <pc:sldMk cId="560821162" sldId="256"/>
-            <ac:spMk id="2" creationId="{84CD5194-FB3F-5711-99ED-23969B899BE0}"/>
-          </ac:spMkLst>
-        </pc:spChg>
-        <pc:spChg chg="mod">
-          <ac:chgData name="Tomi Lind" userId="73fe6e1701840021" providerId="LiveId" clId="{4ED1C821-59B5-4C36-800E-36BF6E3A404E}" dt="2024-03-09T04:11:59.604" v="40" actId="1076"/>
-          <ac:spMkLst>
-            <pc:docMk/>
-            <pc:sldMk cId="560821162" sldId="256"/>
+            <pc:sldMk cId="110841472" sldId="263"/>
             <ac:spMk id="3" creationId="{C404225F-4EB9-154C-370B-F266805E2500}"/>
           </ac:spMkLst>
         </pc:spChg>
         <pc:spChg chg="mod">
-          <ac:chgData name="Tomi Lind" userId="73fe6e1701840021" providerId="LiveId" clId="{4ED1C821-59B5-4C36-800E-36BF6E3A404E}" dt="2024-03-09T04:11:59.604" v="40" actId="1076"/>
+          <ac:chgData name="Tomi Lind" userId="73fe6e1701840021" providerId="LiveId" clId="{4B49EF1C-EBB3-4E83-9F51-0353B7CA028B}" dt="2024-03-15T20:11:19.673" v="22" actId="255"/>
           <ac:spMkLst>
             <pc:docMk/>
-            <pc:sldMk cId="560821162" sldId="256"/>
+            <pc:sldMk cId="110841472" sldId="263"/>
             <ac:spMk id="4" creationId="{6A27C49D-2631-B0BB-B113-6105C713D41F}"/>
           </ac:spMkLst>
         </pc:spChg>
-        <pc:spChg chg="mod">
-          <ac:chgData name="Tomi Lind" userId="73fe6e1701840021" providerId="LiveId" clId="{4ED1C821-59B5-4C36-800E-36BF6E3A404E}" dt="2024-03-09T04:10:14.711" v="10" actId="1076"/>
-          <ac:spMkLst>
-            <pc:docMk/>
-            <pc:sldMk cId="560821162" sldId="256"/>
-            <ac:spMk id="5" creationId="{2E00FE96-874C-182F-11E9-5A7A0FFEA93C}"/>
-          </ac:spMkLst>
-        </pc:spChg>
-        <pc:spChg chg="mod">
-          <ac:chgData name="Tomi Lind" userId="73fe6e1701840021" providerId="LiveId" clId="{4ED1C821-59B5-4C36-800E-36BF6E3A404E}" dt="2024-03-09T04:11:47.572" v="36" actId="27803"/>
-          <ac:spMkLst>
-            <pc:docMk/>
-            <pc:sldMk cId="560821162" sldId="256"/>
-            <ac:spMk id="10" creationId="{3A68FC89-E913-7E06-D846-C6489D43C8FE}"/>
-          </ac:spMkLst>
-        </pc:spChg>
-        <pc:spChg chg="mod">
-          <ac:chgData name="Tomi Lind" userId="73fe6e1701840021" providerId="LiveId" clId="{4ED1C821-59B5-4C36-800E-36BF6E3A404E}" dt="2024-03-09T04:11:47.572" v="36" actId="27803"/>
-          <ac:spMkLst>
-            <pc:docMk/>
-            <pc:sldMk cId="560821162" sldId="256"/>
-            <ac:spMk id="11" creationId="{4E5C6161-1249-EF1F-A582-EE7EF4EE7199}"/>
-          </ac:spMkLst>
-        </pc:spChg>
-        <pc:spChg chg="mod">
-          <ac:chgData name="Tomi Lind" userId="73fe6e1701840021" providerId="LiveId" clId="{4ED1C821-59B5-4C36-800E-36BF6E3A404E}" dt="2024-03-09T04:11:47.572" v="36" actId="27803"/>
-          <ac:spMkLst>
-            <pc:docMk/>
-            <pc:sldMk cId="560821162" sldId="256"/>
-            <ac:spMk id="12" creationId="{36B4DD18-52E7-DE61-DB00-CD6D9C6EA09E}"/>
-          </ac:spMkLst>
-        </pc:spChg>
-        <pc:spChg chg="mod">
-          <ac:chgData name="Tomi Lind" userId="73fe6e1701840021" providerId="LiveId" clId="{4ED1C821-59B5-4C36-800E-36BF6E3A404E}" dt="2024-03-09T04:11:47.572" v="36" actId="27803"/>
-          <ac:spMkLst>
-            <pc:docMk/>
-            <pc:sldMk cId="560821162" sldId="256"/>
-            <ac:spMk id="13" creationId="{D2F86060-6F9A-02A2-6542-2D8BA2DCF0C8}"/>
-          </ac:spMkLst>
-        </pc:spChg>
-        <pc:spChg chg="mod">
-          <ac:chgData name="Tomi Lind" userId="73fe6e1701840021" providerId="LiveId" clId="{4ED1C821-59B5-4C36-800E-36BF6E3A404E}" dt="2024-03-09T04:11:47.572" v="36" actId="27803"/>
-          <ac:spMkLst>
-            <pc:docMk/>
-            <pc:sldMk cId="560821162" sldId="256"/>
-            <ac:spMk id="14" creationId="{192EB200-4635-F814-9506-708AEDBC0F27}"/>
-          </ac:spMkLst>
-        </pc:spChg>
-        <pc:spChg chg="mod">
-          <ac:chgData name="Tomi Lind" userId="73fe6e1701840021" providerId="LiveId" clId="{4ED1C821-59B5-4C36-800E-36BF6E3A404E}" dt="2024-03-09T04:11:57.497" v="38" actId="27803"/>
-          <ac:spMkLst>
-            <pc:docMk/>
-            <pc:sldMk cId="560821162" sldId="256"/>
-            <ac:spMk id="16" creationId="{F8CD7592-C3DE-1DE5-2E5A-14ACAF7A5C74}"/>
-          </ac:spMkLst>
-        </pc:spChg>
-        <pc:spChg chg="mod">
-          <ac:chgData name="Tomi Lind" userId="73fe6e1701840021" providerId="LiveId" clId="{4ED1C821-59B5-4C36-800E-36BF6E3A404E}" dt="2024-03-09T04:11:57.497" v="38" actId="27803"/>
-          <ac:spMkLst>
-            <pc:docMk/>
-            <pc:sldMk cId="560821162" sldId="256"/>
-            <ac:spMk id="17" creationId="{0F1217EA-EBB1-7E11-788C-EAC23233C0DD}"/>
-          </ac:spMkLst>
-        </pc:spChg>
-        <pc:spChg chg="mod">
-          <ac:chgData name="Tomi Lind" userId="73fe6e1701840021" providerId="LiveId" clId="{4ED1C821-59B5-4C36-800E-36BF6E3A404E}" dt="2024-03-09T04:11:57.497" v="38" actId="27803"/>
-          <ac:spMkLst>
-            <pc:docMk/>
-            <pc:sldMk cId="560821162" sldId="256"/>
-            <ac:spMk id="18" creationId="{ABC651B1-516C-A218-AD57-555B4E8F826B}"/>
-          </ac:spMkLst>
-        </pc:spChg>
-        <pc:spChg chg="mod">
-          <ac:chgData name="Tomi Lind" userId="73fe6e1701840021" providerId="LiveId" clId="{4ED1C821-59B5-4C36-800E-36BF6E3A404E}" dt="2024-03-09T04:11:57.497" v="38" actId="27803"/>
-          <ac:spMkLst>
-            <pc:docMk/>
-            <pc:sldMk cId="560821162" sldId="256"/>
-            <ac:spMk id="19" creationId="{49C9B128-20B5-8739-31FE-102EFF8A88DA}"/>
-          </ac:spMkLst>
-        </pc:spChg>
-        <pc:spChg chg="mod">
-          <ac:chgData name="Tomi Lind" userId="73fe6e1701840021" providerId="LiveId" clId="{4ED1C821-59B5-4C36-800E-36BF6E3A404E}" dt="2024-03-09T04:11:57.497" v="38" actId="27803"/>
-          <ac:spMkLst>
-            <pc:docMk/>
-            <pc:sldMk cId="560821162" sldId="256"/>
-            <ac:spMk id="20" creationId="{4989DE69-A871-A8F3-05D4-49F4E329687F}"/>
-          </ac:spMkLst>
-        </pc:spChg>
-        <pc:spChg chg="mod">
-          <ac:chgData name="Tomi Lind" userId="73fe6e1701840021" providerId="LiveId" clId="{4ED1C821-59B5-4C36-800E-36BF6E3A404E}" dt="2024-03-09T04:10:14.711" v="10" actId="1076"/>
-          <ac:spMkLst>
-            <pc:docMk/>
-            <pc:sldMk cId="560821162" sldId="256"/>
-            <ac:spMk id="32" creationId="{90977182-506E-9CB2-B816-1C6014460D79}"/>
-          </ac:spMkLst>
-        </pc:spChg>
-        <pc:spChg chg="mod">
-          <ac:chgData name="Tomi Lind" userId="73fe6e1701840021" providerId="LiveId" clId="{4ED1C821-59B5-4C36-800E-36BF6E3A404E}" dt="2024-03-09T04:10:14.711" v="10" actId="1076"/>
-          <ac:spMkLst>
-            <pc:docMk/>
-            <pc:sldMk cId="560821162" sldId="256"/>
-            <ac:spMk id="33" creationId="{C4ABDBC1-2CF7-0F61-2138-3955A981D482}"/>
-          </ac:spMkLst>
-        </pc:spChg>
-        <pc:grpChg chg="add del mod">
-          <ac:chgData name="Tomi Lind" userId="73fe6e1701840021" providerId="LiveId" clId="{4ED1C821-59B5-4C36-800E-36BF6E3A404E}" dt="2024-03-09T04:11:47.572" v="36" actId="27803"/>
+        <pc:grpChg chg="mod">
+          <ac:chgData name="Tomi Lind" userId="73fe6e1701840021" providerId="LiveId" clId="{4B49EF1C-EBB3-4E83-9F51-0353B7CA028B}" dt="2024-03-15T20:11:16.418" v="20" actId="14100"/>
           <ac:grpSpMkLst>
             <pc:docMk/>
-            <pc:sldMk cId="560821162" sldId="256"/>
-            <ac:grpSpMk id="9" creationId="{027EECAD-A1E5-A3EE-5852-C294E9C34F2D}"/>
-          </ac:grpSpMkLst>
-        </pc:grpChg>
-        <pc:grpChg chg="add del mod">
-          <ac:chgData name="Tomi Lind" userId="73fe6e1701840021" providerId="LiveId" clId="{4ED1C821-59B5-4C36-800E-36BF6E3A404E}" dt="2024-03-09T04:11:57.497" v="38" actId="27803"/>
-          <ac:grpSpMkLst>
-            <pc:docMk/>
-            <pc:sldMk cId="560821162" sldId="256"/>
-            <ac:grpSpMk id="15" creationId="{93A8DA39-624B-B0DC-7B1A-CC752ACD7B53}"/>
-          </ac:grpSpMkLst>
-        </pc:grpChg>
-        <pc:grpChg chg="mod">
-          <ac:chgData name="Tomi Lind" userId="73fe6e1701840021" providerId="LiveId" clId="{4ED1C821-59B5-4C36-800E-36BF6E3A404E}" dt="2024-03-09T04:10:14.711" v="10" actId="1076"/>
-          <ac:grpSpMkLst>
-            <pc:docMk/>
-            <pc:sldMk cId="560821162" sldId="256"/>
-            <ac:grpSpMk id="31" creationId="{013ABD34-BE71-E760-7C47-BE4F4C8CAB31}"/>
-          </ac:grpSpMkLst>
-        </pc:grpChg>
-        <pc:grpChg chg="mod">
-          <ac:chgData name="Tomi Lind" userId="73fe6e1701840021" providerId="LiveId" clId="{4ED1C821-59B5-4C36-800E-36BF6E3A404E}" dt="2024-03-09T04:10:14.711" v="10" actId="1076"/>
-          <ac:grpSpMkLst>
-            <pc:docMk/>
-            <pc:sldMk cId="560821162" sldId="256"/>
-            <ac:grpSpMk id="34" creationId="{74851BA3-4668-3862-FD5C-DDC55608E934}"/>
-          </ac:grpSpMkLst>
-        </pc:grpChg>
-        <pc:grpChg chg="del mod">
-          <ac:chgData name="Tomi Lind" userId="73fe6e1701840021" providerId="LiveId" clId="{4ED1C821-59B5-4C36-800E-36BF6E3A404E}" dt="2024-03-09T04:10:16.135" v="11" actId="478"/>
-          <ac:grpSpMkLst>
-            <pc:docMk/>
-            <pc:sldMk cId="560821162" sldId="256"/>
-            <ac:grpSpMk id="35" creationId="{C9CCF0DF-962C-F968-2818-CE12BC5D887A}"/>
-          </ac:grpSpMkLst>
-        </pc:grpChg>
-        <pc:grpChg chg="mod">
-          <ac:chgData name="Tomi Lind" userId="73fe6e1701840021" providerId="LiveId" clId="{4ED1C821-59B5-4C36-800E-36BF6E3A404E}" dt="2024-03-09T04:11:59.604" v="40" actId="1076"/>
-          <ac:grpSpMkLst>
-            <pc:docMk/>
-            <pc:sldMk cId="560821162" sldId="256"/>
+            <pc:sldMk cId="110841472" sldId="263"/>
             <ac:grpSpMk id="38" creationId="{903AFFB8-7333-CA7E-3061-936D3CC39B64}"/>
           </ac:grpSpMkLst>
         </pc:grpChg>
-        <pc:picChg chg="add del mod">
-          <ac:chgData name="Tomi Lind" userId="73fe6e1701840021" providerId="LiveId" clId="{4ED1C821-59B5-4C36-800E-36BF6E3A404E}" dt="2024-03-09T04:09:30.916" v="1" actId="21"/>
-          <ac:picMkLst>
-            <pc:docMk/>
-            <pc:sldMk cId="560821162" sldId="256"/>
-            <ac:picMk id="7" creationId="{C8C7D250-F7FA-F5AD-F725-AF2E29BC85E5}"/>
-          </ac:picMkLst>
-        </pc:picChg>
-        <pc:picChg chg="add del mod ord">
-          <ac:chgData name="Tomi Lind" userId="73fe6e1701840021" providerId="LiveId" clId="{4ED1C821-59B5-4C36-800E-36BF6E3A404E}" dt="2024-03-09T04:13:29.057" v="49" actId="14100"/>
-          <ac:picMkLst>
-            <pc:docMk/>
-            <pc:sldMk cId="560821162" sldId="256"/>
-            <ac:picMk id="8" creationId="{C8C7D250-F7FA-F5AD-F725-AF2E29BC85E5}"/>
-          </ac:picMkLst>
-        </pc:picChg>
-      </pc:sldChg>
-    </pc:docChg>
-  </pc:docChgLst>
-  <pc:docChgLst>
-    <pc:chgData name="Tomi Lind" userId="73fe6e1701840021" providerId="LiveId" clId="{3A57CA03-FE34-4A8E-A273-5AD7ABDF0FFB}"/>
-    <pc:docChg chg="undo custSel addSld modSld">
-      <pc:chgData name="Tomi Lind" userId="73fe6e1701840021" providerId="LiveId" clId="{3A57CA03-FE34-4A8E-A273-5AD7ABDF0FFB}" dt="2024-03-08T22:01:44.533" v="594" actId="255"/>
-      <pc:docMkLst>
-        <pc:docMk/>
-      </pc:docMkLst>
-      <pc:sldChg chg="addSp delSp modSp new mod modClrScheme chgLayout">
-        <pc:chgData name="Tomi Lind" userId="73fe6e1701840021" providerId="LiveId" clId="{3A57CA03-FE34-4A8E-A273-5AD7ABDF0FFB}" dt="2024-03-08T22:01:44.533" v="594" actId="255"/>
-        <pc:sldMkLst>
-          <pc:docMk/>
-          <pc:sldMk cId="560821162" sldId="256"/>
-        </pc:sldMkLst>
-        <pc:spChg chg="add mod topLvl">
-          <ac:chgData name="Tomi Lind" userId="73fe6e1701840021" providerId="LiveId" clId="{3A57CA03-FE34-4A8E-A273-5AD7ABDF0FFB}" dt="2024-03-08T22:01:29.377" v="592" actId="14100"/>
-          <ac:spMkLst>
-            <pc:docMk/>
-            <pc:sldMk cId="560821162" sldId="256"/>
-            <ac:spMk id="2" creationId="{84CD5194-FB3F-5711-99ED-23969B899BE0}"/>
-          </ac:spMkLst>
-        </pc:spChg>
-        <pc:spChg chg="del">
-          <ac:chgData name="Tomi Lind" userId="73fe6e1701840021" providerId="LiveId" clId="{3A57CA03-FE34-4A8E-A273-5AD7ABDF0FFB}" dt="2024-03-08T20:34:52.336" v="1" actId="700"/>
-          <ac:spMkLst>
-            <pc:docMk/>
-            <pc:sldMk cId="560821162" sldId="256"/>
-            <ac:spMk id="2" creationId="{D74D489C-18CC-45E2-E482-AF67CE36666A}"/>
-          </ac:spMkLst>
-        </pc:spChg>
-        <pc:spChg chg="add mod topLvl">
-          <ac:chgData name="Tomi Lind" userId="73fe6e1701840021" providerId="LiveId" clId="{3A57CA03-FE34-4A8E-A273-5AD7ABDF0FFB}" dt="2024-03-08T22:01:44.533" v="594" actId="255"/>
-          <ac:spMkLst>
-            <pc:docMk/>
-            <pc:sldMk cId="560821162" sldId="256"/>
-            <ac:spMk id="3" creationId="{C404225F-4EB9-154C-370B-F266805E2500}"/>
-          </ac:spMkLst>
-        </pc:spChg>
-        <pc:spChg chg="del">
-          <ac:chgData name="Tomi Lind" userId="73fe6e1701840021" providerId="LiveId" clId="{3A57CA03-FE34-4A8E-A273-5AD7ABDF0FFB}" dt="2024-03-08T20:34:52.336" v="1" actId="700"/>
-          <ac:spMkLst>
-            <pc:docMk/>
-            <pc:sldMk cId="560821162" sldId="256"/>
-            <ac:spMk id="3" creationId="{D1D82D1A-E70D-8176-10CF-A48E4A1B525C}"/>
-          </ac:spMkLst>
-        </pc:spChg>
-        <pc:spChg chg="add mod topLvl">
-          <ac:chgData name="Tomi Lind" userId="73fe6e1701840021" providerId="LiveId" clId="{3A57CA03-FE34-4A8E-A273-5AD7ABDF0FFB}" dt="2024-03-08T22:00:25.787" v="587" actId="14100"/>
-          <ac:spMkLst>
-            <pc:docMk/>
-            <pc:sldMk cId="560821162" sldId="256"/>
-            <ac:spMk id="4" creationId="{6A27C49D-2631-B0BB-B113-6105C713D41F}"/>
-          </ac:spMkLst>
-        </pc:spChg>
-        <pc:spChg chg="add mod topLvl">
-          <ac:chgData name="Tomi Lind" userId="73fe6e1701840021" providerId="LiveId" clId="{3A57CA03-FE34-4A8E-A273-5AD7ABDF0FFB}" dt="2024-03-08T22:01:29.377" v="592" actId="14100"/>
-          <ac:spMkLst>
-            <pc:docMk/>
-            <pc:sldMk cId="560821162" sldId="256"/>
-            <ac:spMk id="5" creationId="{2E00FE96-874C-182F-11E9-5A7A0FFEA93C}"/>
-          </ac:spMkLst>
-        </pc:spChg>
-        <pc:spChg chg="mod">
-          <ac:chgData name="Tomi Lind" userId="73fe6e1701840021" providerId="LiveId" clId="{3A57CA03-FE34-4A8E-A273-5AD7ABDF0FFB}" dt="2024-03-08T20:38:12.789" v="5" actId="27803"/>
-          <ac:spMkLst>
-            <pc:docMk/>
-            <pc:sldMk cId="560821162" sldId="256"/>
-            <ac:spMk id="7" creationId="{4A2D1A36-65DE-889E-67E4-43469508B3AA}"/>
-          </ac:spMkLst>
-        </pc:spChg>
-        <pc:spChg chg="add mod">
-          <ac:chgData name="Tomi Lind" userId="73fe6e1701840021" providerId="LiveId" clId="{3A57CA03-FE34-4A8E-A273-5AD7ABDF0FFB}" dt="2024-03-08T21:20:51.516" v="123" actId="571"/>
-          <ac:spMkLst>
-            <pc:docMk/>
-            <pc:sldMk cId="560821162" sldId="256"/>
-            <ac:spMk id="8" creationId="{77C2010D-67D5-06D0-9D45-67E850B1B2A2}"/>
-          </ac:spMkLst>
-        </pc:spChg>
-        <pc:spChg chg="mod">
-          <ac:chgData name="Tomi Lind" userId="73fe6e1701840021" providerId="LiveId" clId="{3A57CA03-FE34-4A8E-A273-5AD7ABDF0FFB}" dt="2024-03-08T20:38:12.789" v="5" actId="27803"/>
-          <ac:spMkLst>
-            <pc:docMk/>
-            <pc:sldMk cId="560821162" sldId="256"/>
-            <ac:spMk id="8" creationId="{A7A81906-31C8-C5A7-F7A1-E15F017C1D94}"/>
-          </ac:spMkLst>
-        </pc:spChg>
-        <pc:spChg chg="mod">
-          <ac:chgData name="Tomi Lind" userId="73fe6e1701840021" providerId="LiveId" clId="{3A57CA03-FE34-4A8E-A273-5AD7ABDF0FFB}" dt="2024-03-08T20:38:12.789" v="5" actId="27803"/>
-          <ac:spMkLst>
-            <pc:docMk/>
-            <pc:sldMk cId="560821162" sldId="256"/>
-            <ac:spMk id="9" creationId="{1B584128-AB83-1F7A-C5A3-356AA175D209}"/>
-          </ac:spMkLst>
-        </pc:spChg>
-        <pc:spChg chg="mod">
-          <ac:chgData name="Tomi Lind" userId="73fe6e1701840021" providerId="LiveId" clId="{3A57CA03-FE34-4A8E-A273-5AD7ABDF0FFB}" dt="2024-03-08T20:38:12.789" v="5" actId="27803"/>
-          <ac:spMkLst>
-            <pc:docMk/>
-            <pc:sldMk cId="560821162" sldId="256"/>
-            <ac:spMk id="10" creationId="{BE4B29D0-3F99-3D4A-EB5B-5EBFB4132E6D}"/>
-          </ac:spMkLst>
-        </pc:spChg>
-        <pc:spChg chg="mod">
-          <ac:chgData name="Tomi Lind" userId="73fe6e1701840021" providerId="LiveId" clId="{3A57CA03-FE34-4A8E-A273-5AD7ABDF0FFB}" dt="2024-03-08T20:38:12.789" v="5" actId="27803"/>
-          <ac:spMkLst>
-            <pc:docMk/>
-            <pc:sldMk cId="560821162" sldId="256"/>
-            <ac:spMk id="11" creationId="{E6FC11E1-53F9-8CAA-7BB7-D98555CE6A38}"/>
-          </ac:spMkLst>
-        </pc:spChg>
-        <pc:spChg chg="mod">
-          <ac:chgData name="Tomi Lind" userId="73fe6e1701840021" providerId="LiveId" clId="{3A57CA03-FE34-4A8E-A273-5AD7ABDF0FFB}" dt="2024-03-08T20:38:12.789" v="5" actId="27803"/>
-          <ac:spMkLst>
-            <pc:docMk/>
-            <pc:sldMk cId="560821162" sldId="256"/>
-            <ac:spMk id="12" creationId="{9B3E7586-A014-32AC-A147-EBB2B62A909F}"/>
-          </ac:spMkLst>
-        </pc:spChg>
-        <pc:spChg chg="mod">
-          <ac:chgData name="Tomi Lind" userId="73fe6e1701840021" providerId="LiveId" clId="{3A57CA03-FE34-4A8E-A273-5AD7ABDF0FFB}" dt="2024-03-08T20:38:12.789" v="5" actId="27803"/>
-          <ac:spMkLst>
-            <pc:docMk/>
-            <pc:sldMk cId="560821162" sldId="256"/>
-            <ac:spMk id="13" creationId="{FDCF9538-AC79-0B35-A708-CF5C73821F80}"/>
-          </ac:spMkLst>
-        </pc:spChg>
-        <pc:spChg chg="mod">
-          <ac:chgData name="Tomi Lind" userId="73fe6e1701840021" providerId="LiveId" clId="{3A57CA03-FE34-4A8E-A273-5AD7ABDF0FFB}" dt="2024-03-08T20:38:12.789" v="5" actId="27803"/>
-          <ac:spMkLst>
-            <pc:docMk/>
-            <pc:sldMk cId="560821162" sldId="256"/>
-            <ac:spMk id="14" creationId="{2D5A1DE2-1181-BB60-736F-FE5E19FB1531}"/>
-          </ac:spMkLst>
-        </pc:spChg>
-        <pc:spChg chg="mod">
-          <ac:chgData name="Tomi Lind" userId="73fe6e1701840021" providerId="LiveId" clId="{3A57CA03-FE34-4A8E-A273-5AD7ABDF0FFB}" dt="2024-03-08T20:38:12.789" v="5" actId="27803"/>
-          <ac:spMkLst>
-            <pc:docMk/>
-            <pc:sldMk cId="560821162" sldId="256"/>
-            <ac:spMk id="15" creationId="{C452658A-1AB6-AEAD-BD99-4E1F3CC839B8}"/>
-          </ac:spMkLst>
-        </pc:spChg>
-        <pc:spChg chg="add del mod">
-          <ac:chgData name="Tomi Lind" userId="73fe6e1701840021" providerId="LiveId" clId="{3A57CA03-FE34-4A8E-A273-5AD7ABDF0FFB}" dt="2024-03-08T21:31:07.334" v="345" actId="478"/>
-          <ac:spMkLst>
-            <pc:docMk/>
-            <pc:sldMk cId="560821162" sldId="256"/>
-            <ac:spMk id="18" creationId="{B1DEB2EA-9FFF-0284-B287-11D496F2142D}"/>
-          </ac:spMkLst>
-        </pc:spChg>
-        <pc:spChg chg="mod">
-          <ac:chgData name="Tomi Lind" userId="73fe6e1701840021" providerId="LiveId" clId="{3A57CA03-FE34-4A8E-A273-5AD7ABDF0FFB}" dt="2024-03-08T21:34:20.214" v="381" actId="27803"/>
-          <ac:spMkLst>
-            <pc:docMk/>
-            <pc:sldMk cId="560821162" sldId="256"/>
-            <ac:spMk id="22" creationId="{0C6CCE44-FCDC-5B2B-CE47-67815D953A2C}"/>
-          </ac:spMkLst>
-        </pc:spChg>
-        <pc:spChg chg="mod">
-          <ac:chgData name="Tomi Lind" userId="73fe6e1701840021" providerId="LiveId" clId="{3A57CA03-FE34-4A8E-A273-5AD7ABDF0FFB}" dt="2024-03-08T21:40:27.167" v="385" actId="207"/>
-          <ac:spMkLst>
-            <pc:docMk/>
-            <pc:sldMk cId="560821162" sldId="256"/>
-            <ac:spMk id="23" creationId="{4005B098-46E0-D53B-F0FB-02B389352F1B}"/>
-          </ac:spMkLst>
-        </pc:spChg>
-        <pc:spChg chg="mod ord">
-          <ac:chgData name="Tomi Lind" userId="73fe6e1701840021" providerId="LiveId" clId="{3A57CA03-FE34-4A8E-A273-5AD7ABDF0FFB}" dt="2024-03-08T21:41:06.397" v="399" actId="167"/>
-          <ac:spMkLst>
-            <pc:docMk/>
-            <pc:sldMk cId="560821162" sldId="256"/>
-            <ac:spMk id="25" creationId="{8B2E1E1A-0229-19E5-13B4-F4A2BE869034}"/>
-          </ac:spMkLst>
-        </pc:spChg>
-        <pc:spChg chg="mod">
-          <ac:chgData name="Tomi Lind" userId="73fe6e1701840021" providerId="LiveId" clId="{3A57CA03-FE34-4A8E-A273-5AD7ABDF0FFB}" dt="2024-03-08T21:40:38.055" v="387" actId="27803"/>
-          <ac:spMkLst>
-            <pc:docMk/>
-            <pc:sldMk cId="560821162" sldId="256"/>
-            <ac:spMk id="26" creationId="{00EA093A-D71D-6F35-9C25-31291EBE2763}"/>
-          </ac:spMkLst>
-        </pc:spChg>
-        <pc:spChg chg="mod">
-          <ac:chgData name="Tomi Lind" userId="73fe6e1701840021" providerId="LiveId" clId="{3A57CA03-FE34-4A8E-A273-5AD7ABDF0FFB}" dt="2024-03-08T21:41:16.332" v="402" actId="27803"/>
-          <ac:spMkLst>
-            <pc:docMk/>
-            <pc:sldMk cId="560821162" sldId="256"/>
-            <ac:spMk id="28" creationId="{6533F810-7E84-71C0-9D8E-ABF1AB63A479}"/>
-          </ac:spMkLst>
-        </pc:spChg>
-        <pc:spChg chg="mod">
-          <ac:chgData name="Tomi Lind" userId="73fe6e1701840021" providerId="LiveId" clId="{3A57CA03-FE34-4A8E-A273-5AD7ABDF0FFB}" dt="2024-03-08T21:41:16.332" v="402" actId="27803"/>
-          <ac:spMkLst>
-            <pc:docMk/>
-            <pc:sldMk cId="560821162" sldId="256"/>
-            <ac:spMk id="29" creationId="{5E83E7DB-6FC4-583D-F6EF-AAB1C550DFB5}"/>
-          </ac:spMkLst>
-        </pc:spChg>
-        <pc:spChg chg="mod">
-          <ac:chgData name="Tomi Lind" userId="73fe6e1701840021" providerId="LiveId" clId="{3A57CA03-FE34-4A8E-A273-5AD7ABDF0FFB}" dt="2024-03-08T22:01:29.377" v="592" actId="14100"/>
-          <ac:spMkLst>
-            <pc:docMk/>
-            <pc:sldMk cId="560821162" sldId="256"/>
-            <ac:spMk id="32" creationId="{90977182-506E-9CB2-B816-1C6014460D79}"/>
-          </ac:spMkLst>
-        </pc:spChg>
-        <pc:spChg chg="mod">
-          <ac:chgData name="Tomi Lind" userId="73fe6e1701840021" providerId="LiveId" clId="{3A57CA03-FE34-4A8E-A273-5AD7ABDF0FFB}" dt="2024-03-08T22:01:29.377" v="592" actId="14100"/>
-          <ac:spMkLst>
-            <pc:docMk/>
-            <pc:sldMk cId="560821162" sldId="256"/>
-            <ac:spMk id="33" creationId="{C4ABDBC1-2CF7-0F61-2138-3955A981D482}"/>
-          </ac:spMkLst>
-        </pc:spChg>
-        <pc:grpChg chg="del mod">
-          <ac:chgData name="Tomi Lind" userId="73fe6e1701840021" providerId="LiveId" clId="{3A57CA03-FE34-4A8E-A273-5AD7ABDF0FFB}" dt="2024-03-08T20:48:31.521" v="6" actId="478"/>
-          <ac:grpSpMkLst>
-            <pc:docMk/>
-            <pc:sldMk cId="560821162" sldId="256"/>
-            <ac:grpSpMk id="6" creationId="{226A0A8B-10A4-89C7-DD7E-88FB21269AF0}"/>
-          </ac:grpSpMkLst>
-        </pc:grpChg>
-        <pc:grpChg chg="add mod">
-          <ac:chgData name="Tomi Lind" userId="73fe6e1701840021" providerId="LiveId" clId="{3A57CA03-FE34-4A8E-A273-5AD7ABDF0FFB}" dt="2024-03-08T21:06:33.471" v="17" actId="338"/>
-          <ac:grpSpMkLst>
-            <pc:docMk/>
-            <pc:sldMk cId="560821162" sldId="256"/>
-            <ac:grpSpMk id="6" creationId="{B6FCDFF4-2038-7CCD-6C89-EEB405C14146}"/>
-          </ac:grpSpMkLst>
-        </pc:grpChg>
-        <pc:grpChg chg="add mod">
-          <ac:chgData name="Tomi Lind" userId="73fe6e1701840021" providerId="LiveId" clId="{3A57CA03-FE34-4A8E-A273-5AD7ABDF0FFB}" dt="2024-03-08T21:08:17.710" v="63" actId="164"/>
-          <ac:grpSpMkLst>
-            <pc:docMk/>
-            <pc:sldMk cId="560821162" sldId="256"/>
-            <ac:grpSpMk id="7" creationId="{54B96A89-AF9E-EA05-2DA1-839208FFC0BF}"/>
-          </ac:grpSpMkLst>
-        </pc:grpChg>
-        <pc:grpChg chg="add del mod">
-          <ac:chgData name="Tomi Lind" userId="73fe6e1701840021" providerId="LiveId" clId="{3A57CA03-FE34-4A8E-A273-5AD7ABDF0FFB}" dt="2024-03-08T21:24:25.623" v="273" actId="165"/>
-          <ac:grpSpMkLst>
-            <pc:docMk/>
-            <pc:sldMk cId="560821162" sldId="256"/>
-            <ac:grpSpMk id="11" creationId="{189B4EEE-38A1-2937-346A-CBEBD95A7904}"/>
-          </ac:grpSpMkLst>
-        </pc:grpChg>
-        <pc:grpChg chg="add del mod">
-          <ac:chgData name="Tomi Lind" userId="73fe6e1701840021" providerId="LiveId" clId="{3A57CA03-FE34-4A8E-A273-5AD7ABDF0FFB}" dt="2024-03-08T20:54:19.051" v="10" actId="165"/>
-          <ac:grpSpMkLst>
-            <pc:docMk/>
-            <pc:sldMk cId="560821162" sldId="256"/>
-            <ac:grpSpMk id="16" creationId="{01ED2AB9-FA4F-3125-A099-136AC96BF39C}"/>
-          </ac:grpSpMkLst>
-        </pc:grpChg>
-        <pc:grpChg chg="add mod">
-          <ac:chgData name="Tomi Lind" userId="73fe6e1701840021" providerId="LiveId" clId="{3A57CA03-FE34-4A8E-A273-5AD7ABDF0FFB}" dt="2024-03-08T21:31:25.858" v="349" actId="338"/>
-          <ac:grpSpMkLst>
-            <pc:docMk/>
-            <pc:sldMk cId="560821162" sldId="256"/>
-            <ac:grpSpMk id="19" creationId="{5663F353-37A1-317E-3B3F-E20D5602DDC7}"/>
-          </ac:grpSpMkLst>
-        </pc:grpChg>
-        <pc:grpChg chg="add mod">
-          <ac:chgData name="Tomi Lind" userId="73fe6e1701840021" providerId="LiveId" clId="{3A57CA03-FE34-4A8E-A273-5AD7ABDF0FFB}" dt="2024-03-08T21:32:27.803" v="359" actId="164"/>
-          <ac:grpSpMkLst>
-            <pc:docMk/>
-            <pc:sldMk cId="560821162" sldId="256"/>
-            <ac:grpSpMk id="20" creationId="{BE7061CB-060F-11A6-E7BC-D0A18973CC27}"/>
-          </ac:grpSpMkLst>
-        </pc:grpChg>
-        <pc:grpChg chg="mod">
-          <ac:chgData name="Tomi Lind" userId="73fe6e1701840021" providerId="LiveId" clId="{3A57CA03-FE34-4A8E-A273-5AD7ABDF0FFB}" dt="2024-03-08T21:34:20.214" v="381" actId="27803"/>
-          <ac:grpSpMkLst>
-            <pc:docMk/>
-            <pc:sldMk cId="560821162" sldId="256"/>
-            <ac:grpSpMk id="21" creationId="{FD5AFF69-1E83-9E08-FF8E-6085B082E210}"/>
-          </ac:grpSpMkLst>
-        </pc:grpChg>
-        <pc:grpChg chg="mod">
-          <ac:chgData name="Tomi Lind" userId="73fe6e1701840021" providerId="LiveId" clId="{3A57CA03-FE34-4A8E-A273-5AD7ABDF0FFB}" dt="2024-03-08T21:40:38.055" v="387" actId="27803"/>
-          <ac:grpSpMkLst>
-            <pc:docMk/>
-            <pc:sldMk cId="560821162" sldId="256"/>
-            <ac:grpSpMk id="24" creationId="{A96D4881-75E9-3E45-78C7-68836F7E3B95}"/>
-          </ac:grpSpMkLst>
-        </pc:grpChg>
-        <pc:grpChg chg="mod">
-          <ac:chgData name="Tomi Lind" userId="73fe6e1701840021" providerId="LiveId" clId="{3A57CA03-FE34-4A8E-A273-5AD7ABDF0FFB}" dt="2024-03-08T21:41:16.332" v="402" actId="27803"/>
-          <ac:grpSpMkLst>
-            <pc:docMk/>
-            <pc:sldMk cId="560821162" sldId="256"/>
-            <ac:grpSpMk id="27" creationId="{E4F9B0F1-A5E1-10A3-17F5-D9CDF5C22700}"/>
-          </ac:grpSpMkLst>
-        </pc:grpChg>
-        <pc:grpChg chg="add del mod">
-          <ac:chgData name="Tomi Lind" userId="73fe6e1701840021" providerId="LiveId" clId="{3A57CA03-FE34-4A8E-A273-5AD7ABDF0FFB}" dt="2024-03-08T21:41:38.420" v="410" actId="165"/>
-          <ac:grpSpMkLst>
-            <pc:docMk/>
-            <pc:sldMk cId="560821162" sldId="256"/>
-            <ac:grpSpMk id="30" creationId="{72DEFFE1-8C7D-7E23-81D7-733DBEED64DE}"/>
-          </ac:grpSpMkLst>
-        </pc:grpChg>
-        <pc:grpChg chg="mod ord">
-          <ac:chgData name="Tomi Lind" userId="73fe6e1701840021" providerId="LiveId" clId="{3A57CA03-FE34-4A8E-A273-5AD7ABDF0FFB}" dt="2024-03-08T22:01:29.377" v="592" actId="14100"/>
-          <ac:grpSpMkLst>
-            <pc:docMk/>
-            <pc:sldMk cId="560821162" sldId="256"/>
-            <ac:grpSpMk id="31" creationId="{013ABD34-BE71-E760-7C47-BE4F4C8CAB31}"/>
-          </ac:grpSpMkLst>
-        </pc:grpChg>
-        <pc:grpChg chg="add mod">
-          <ac:chgData name="Tomi Lind" userId="73fe6e1701840021" providerId="LiveId" clId="{3A57CA03-FE34-4A8E-A273-5AD7ABDF0FFB}" dt="2024-03-08T22:01:29.377" v="592" actId="14100"/>
-          <ac:grpSpMkLst>
-            <pc:docMk/>
-            <pc:sldMk cId="560821162" sldId="256"/>
-            <ac:grpSpMk id="34" creationId="{74851BA3-4668-3862-FD5C-DDC55608E934}"/>
-          </ac:grpSpMkLst>
-        </pc:grpChg>
-        <pc:grpChg chg="add mod">
-          <ac:chgData name="Tomi Lind" userId="73fe6e1701840021" providerId="LiveId" clId="{3A57CA03-FE34-4A8E-A273-5AD7ABDF0FFB}" dt="2024-03-08T22:01:29.377" v="592" actId="14100"/>
-          <ac:grpSpMkLst>
-            <pc:docMk/>
-            <pc:sldMk cId="560821162" sldId="256"/>
-            <ac:grpSpMk id="35" creationId="{C9CCF0DF-962C-F968-2818-CE12BC5D887A}"/>
-          </ac:grpSpMkLst>
-        </pc:grpChg>
-        <pc:grpChg chg="add mod">
-          <ac:chgData name="Tomi Lind" userId="73fe6e1701840021" providerId="LiveId" clId="{3A57CA03-FE34-4A8E-A273-5AD7ABDF0FFB}" dt="2024-03-08T22:00:25.787" v="587" actId="14100"/>
-          <ac:grpSpMkLst>
-            <pc:docMk/>
-            <pc:sldMk cId="560821162" sldId="256"/>
-            <ac:grpSpMk id="38" creationId="{903AFFB8-7333-CA7E-3061-936D3CC39B64}"/>
-          </ac:grpSpMkLst>
-        </pc:grpChg>
-        <pc:picChg chg="add del mod">
-          <ac:chgData name="Tomi Lind" userId="73fe6e1701840021" providerId="LiveId" clId="{3A57CA03-FE34-4A8E-A273-5AD7ABDF0FFB}" dt="2024-03-08T20:38:12.789" v="5" actId="27803"/>
-          <ac:picMkLst>
-            <pc:docMk/>
-            <pc:sldMk cId="560821162" sldId="256"/>
-            <ac:picMk id="5" creationId="{A29684E8-618B-975B-7E0E-96EDE2D25C7C}"/>
-          </ac:picMkLst>
-        </pc:picChg>
-        <pc:picChg chg="add del mod ord topLvl">
-          <ac:chgData name="Tomi Lind" userId="73fe6e1701840021" providerId="LiveId" clId="{3A57CA03-FE34-4A8E-A273-5AD7ABDF0FFB}" dt="2024-03-08T21:42:18.403" v="416" actId="27803"/>
-          <ac:picMkLst>
-            <pc:docMk/>
-            <pc:sldMk cId="560821162" sldId="256"/>
-            <ac:picMk id="10" creationId="{D733FEEF-AFD6-0682-E791-395D8EC3772D}"/>
-          </ac:picMkLst>
-        </pc:picChg>
-        <pc:picChg chg="add del mod ord modCrop">
-          <ac:chgData name="Tomi Lind" userId="73fe6e1701840021" providerId="LiveId" clId="{3A57CA03-FE34-4A8E-A273-5AD7ABDF0FFB}" dt="2024-03-08T22:01:02.253" v="590" actId="478"/>
-          <ac:picMkLst>
-            <pc:docMk/>
-            <pc:sldMk cId="560821162" sldId="256"/>
-            <ac:picMk id="37" creationId="{904A3F71-B751-AD23-ADBD-6FC7C53D7556}"/>
-          </ac:picMkLst>
-        </pc:picChg>
-        <pc:cxnChg chg="add del mod">
-          <ac:chgData name="Tomi Lind" userId="73fe6e1701840021" providerId="LiveId" clId="{3A57CA03-FE34-4A8E-A273-5AD7ABDF0FFB}" dt="2024-03-08T21:31:11.207" v="347" actId="478"/>
-          <ac:cxnSpMkLst>
-            <pc:docMk/>
-            <pc:sldMk cId="560821162" sldId="256"/>
-            <ac:cxnSpMk id="13" creationId="{1DBC66FE-F42E-BFFC-233C-A209AA3FA653}"/>
-          </ac:cxnSpMkLst>
-        </pc:cxnChg>
-        <pc:cxnChg chg="add del mod">
-          <ac:chgData name="Tomi Lind" userId="73fe6e1701840021" providerId="LiveId" clId="{3A57CA03-FE34-4A8E-A273-5AD7ABDF0FFB}" dt="2024-03-08T21:31:10.194" v="346" actId="478"/>
-          <ac:cxnSpMkLst>
-            <pc:docMk/>
-            <pc:sldMk cId="560821162" sldId="256"/>
-            <ac:cxnSpMk id="17" creationId="{5C9DB851-70ED-5497-D11D-A59F8BD022B2}"/>
-          </ac:cxnSpMkLst>
-        </pc:cxnChg>
       </pc:sldChg>
     </pc:docChg>
   </pc:docChgLst>
@@ -841,7 +296,7 @@
           <a:p>
             <a:fld id="{75D0A277-1334-4236-85D9-B2D317AA20BB}" type="datetimeFigureOut">
               <a:rPr lang="en-FI" smtClean="0"/>
-              <a:t>09/03/2024</a:t>
+              <a:t>15/03/2024</a:t>
             </a:fld>
             <a:endParaRPr lang="en-FI"/>
           </a:p>
@@ -1011,7 +466,7 @@
           <a:p>
             <a:fld id="{75D0A277-1334-4236-85D9-B2D317AA20BB}" type="datetimeFigureOut">
               <a:rPr lang="en-FI" smtClean="0"/>
-              <a:t>09/03/2024</a:t>
+              <a:t>15/03/2024</a:t>
             </a:fld>
             <a:endParaRPr lang="en-FI"/>
           </a:p>
@@ -1191,7 +646,7 @@
           <a:p>
             <a:fld id="{75D0A277-1334-4236-85D9-B2D317AA20BB}" type="datetimeFigureOut">
               <a:rPr lang="en-FI" smtClean="0"/>
-              <a:t>09/03/2024</a:t>
+              <a:t>15/03/2024</a:t>
             </a:fld>
             <a:endParaRPr lang="en-FI"/>
           </a:p>
@@ -1361,7 +816,7 @@
           <a:p>
             <a:fld id="{75D0A277-1334-4236-85D9-B2D317AA20BB}" type="datetimeFigureOut">
               <a:rPr lang="en-FI" smtClean="0"/>
-              <a:t>09/03/2024</a:t>
+              <a:t>15/03/2024</a:t>
             </a:fld>
             <a:endParaRPr lang="en-FI"/>
           </a:p>
@@ -1607,7 +1062,7 @@
           <a:p>
             <a:fld id="{75D0A277-1334-4236-85D9-B2D317AA20BB}" type="datetimeFigureOut">
               <a:rPr lang="en-FI" smtClean="0"/>
-              <a:t>09/03/2024</a:t>
+              <a:t>15/03/2024</a:t>
             </a:fld>
             <a:endParaRPr lang="en-FI"/>
           </a:p>
@@ -1839,7 +1294,7 @@
           <a:p>
             <a:fld id="{75D0A277-1334-4236-85D9-B2D317AA20BB}" type="datetimeFigureOut">
               <a:rPr lang="en-FI" smtClean="0"/>
-              <a:t>09/03/2024</a:t>
+              <a:t>15/03/2024</a:t>
             </a:fld>
             <a:endParaRPr lang="en-FI"/>
           </a:p>
@@ -2206,7 +1661,7 @@
           <a:p>
             <a:fld id="{75D0A277-1334-4236-85D9-B2D317AA20BB}" type="datetimeFigureOut">
               <a:rPr lang="en-FI" smtClean="0"/>
-              <a:t>09/03/2024</a:t>
+              <a:t>15/03/2024</a:t>
             </a:fld>
             <a:endParaRPr lang="en-FI"/>
           </a:p>
@@ -2324,7 +1779,7 @@
           <a:p>
             <a:fld id="{75D0A277-1334-4236-85D9-B2D317AA20BB}" type="datetimeFigureOut">
               <a:rPr lang="en-FI" smtClean="0"/>
-              <a:t>09/03/2024</a:t>
+              <a:t>15/03/2024</a:t>
             </a:fld>
             <a:endParaRPr lang="en-FI"/>
           </a:p>
@@ -2419,7 +1874,7 @@
           <a:p>
             <a:fld id="{75D0A277-1334-4236-85D9-B2D317AA20BB}" type="datetimeFigureOut">
               <a:rPr lang="en-FI" smtClean="0"/>
-              <a:t>09/03/2024</a:t>
+              <a:t>15/03/2024</a:t>
             </a:fld>
             <a:endParaRPr lang="en-FI"/>
           </a:p>
@@ -2696,7 +2151,7 @@
           <a:p>
             <a:fld id="{75D0A277-1334-4236-85D9-B2D317AA20BB}" type="datetimeFigureOut">
               <a:rPr lang="en-FI" smtClean="0"/>
-              <a:t>09/03/2024</a:t>
+              <a:t>15/03/2024</a:t>
             </a:fld>
             <a:endParaRPr lang="en-FI"/>
           </a:p>
@@ -2953,7 +2408,7 @@
           <a:p>
             <a:fld id="{75D0A277-1334-4236-85D9-B2D317AA20BB}" type="datetimeFigureOut">
               <a:rPr lang="en-FI" smtClean="0"/>
-              <a:t>09/03/2024</a:t>
+              <a:t>15/03/2024</a:t>
             </a:fld>
             <a:endParaRPr lang="en-FI"/>
           </a:p>
@@ -3166,7 +2621,7 @@
           <a:p>
             <a:fld id="{75D0A277-1334-4236-85D9-B2D317AA20BB}" type="datetimeFigureOut">
               <a:rPr lang="en-FI" smtClean="0"/>
-              <a:t>09/03/2024</a:t>
+              <a:t>15/03/2024</a:t>
             </a:fld>
             <a:endParaRPr lang="en-FI"/>
           </a:p>
@@ -3555,8 +3010,18 @@
 </file>
 
 <file path=ppt/slides/slide1.xml><?xml version="1.0" encoding="utf-8"?>
-<p:sld xmlns:a="http://schemas.openxmlformats.org/drawingml/2006/main" xmlns:r="http://schemas.openxmlformats.org/officeDocument/2006/relationships" xmlns:p="http://schemas.openxmlformats.org/presentationml/2006/main" showMasterSp="0">
+<p:sld xmlns:a="http://schemas.openxmlformats.org/drawingml/2006/main" xmlns:r="http://schemas.openxmlformats.org/officeDocument/2006/relationships" xmlns:p="http://schemas.openxmlformats.org/presentationml/2006/main">
   <p:cSld>
+    <p:bg>
+      <p:bgPr>
+        <a:solidFill>
+          <a:schemeClr val="accent1">
+            <a:alpha val="0"/>
+          </a:schemeClr>
+        </a:solidFill>
+        <a:effectLst/>
+      </p:bgPr>
+    </p:bg>
     <p:spTree>
       <p:nvGrpSpPr>
         <p:cNvPr id="1" name=""/>
@@ -3571,45 +3036,6 @@
           <a:chExt cx="0" cy="0"/>
         </a:xfrm>
       </p:grpSpPr>
-      <p:pic>
-        <p:nvPicPr>
-          <p:cNvPr id="8" name="Graphic 7">
-            <a:extLst>
-              <a:ext uri="{FF2B5EF4-FFF2-40B4-BE49-F238E27FC236}">
-                <a16:creationId xmlns:a16="http://schemas.microsoft.com/office/drawing/2014/main" id="{C8C7D250-F7FA-F5AD-F725-AF2E29BC85E5}"/>
-              </a:ext>
-            </a:extLst>
-          </p:cNvPr>
-          <p:cNvPicPr>
-            <a:picLocks noChangeAspect="1"/>
-          </p:cNvPicPr>
-          <p:nvPr/>
-        </p:nvPicPr>
-        <p:blipFill>
-          <a:blip r:embed="rId2">
-            <a:extLst>
-              <a:ext uri="{28A0092B-C50C-407E-A947-70E740481C1C}">
-                <a14:useLocalDpi xmlns:a14="http://schemas.microsoft.com/office/drawing/2010/main" val="0"/>
-              </a:ext>
-              <a:ext uri="{96DAC541-7B7A-43D3-8B79-37D633B846F1}">
-                <asvg:svgBlip xmlns:asvg="http://schemas.microsoft.com/office/drawing/2016/SVG/main" r:embed="rId3"/>
-              </a:ext>
-            </a:extLst>
-          </a:blip>
-          <a:stretch>
-            <a:fillRect/>
-          </a:stretch>
-        </p:blipFill>
-        <p:spPr>
-          <a:xfrm>
-            <a:off x="0" y="0"/>
-            <a:ext cx="3240088" cy="3240088"/>
-          </a:xfrm>
-          <a:prstGeom prst="rect">
-            <a:avLst/>
-          </a:prstGeom>
-        </p:spPr>
-      </p:pic>
       <p:grpSp>
         <p:nvGrpSpPr>
           <p:cNvPr id="38" name="Group 37">
@@ -3624,10 +3050,10 @@
         </p:nvGrpSpPr>
         <p:grpSpPr>
           <a:xfrm>
-            <a:off x="2523952" y="126788"/>
-            <a:ext cx="6795089" cy="2799871"/>
-            <a:chOff x="2523951" y="306968"/>
-            <a:chExt cx="6795089" cy="2799872"/>
+            <a:off x="2520777" y="126788"/>
+            <a:ext cx="6795089" cy="2778867"/>
+            <a:chOff x="2523951" y="345068"/>
+            <a:chExt cx="6795089" cy="2778868"/>
           </a:xfrm>
         </p:grpSpPr>
         <p:sp>
@@ -3646,7 +3072,7 @@
           </p:nvSpPr>
           <p:spPr bwMode="auto">
             <a:xfrm>
-              <a:off x="2523951" y="306968"/>
+              <a:off x="2523951" y="345068"/>
               <a:ext cx="6795089" cy="2182153"/>
             </a:xfrm>
             <a:prstGeom prst="rect">
@@ -3733,8 +3159,8 @@
           </p:nvSpPr>
           <p:spPr bwMode="auto">
             <a:xfrm>
-              <a:off x="3829050" y="2325831"/>
-              <a:ext cx="5295900" cy="781009"/>
+              <a:off x="2776855" y="2342927"/>
+              <a:ext cx="6408420" cy="781009"/>
             </a:xfrm>
             <a:prstGeom prst="rect">
               <a:avLst/>
@@ -3790,25 +3216,64 @@
                 </a:spcAft>
               </a:pPr>
               <a:r>
-                <a:rPr lang="en-FI" altLang="en-FI" sz="6000" i="1" dirty="0">
+                <a:rPr lang="en-FI" altLang="en-FI" sz="7600" b="1" i="1" dirty="0" err="1">
                   <a:solidFill>
                     <a:srgbClr val="4D4D4D"/>
                   </a:solidFill>
-                  <a:latin typeface="Calibri" panose="020F0502020204030204" pitchFamily="34" charset="0"/>
+                  <a:latin typeface="Ubuntu" panose="020B0504030602030204" pitchFamily="34" charset="0"/>
                 </a:rPr>
-                <a:t>SALAMAVERKKO</a:t>
+                <a:t>salamaverkko</a:t>
               </a:r>
-              <a:endParaRPr lang="en-FI" altLang="en-FI" sz="6000" dirty="0">
-                <a:latin typeface="Arial" panose="020B0604020202020204" pitchFamily="34" charset="0"/>
+              <a:endParaRPr lang="en-FI" altLang="en-FI" sz="7600" b="1" dirty="0">
+                <a:latin typeface="Ubuntu" panose="020B0504030602030204" pitchFamily="34" charset="0"/>
               </a:endParaRPr>
             </a:p>
           </p:txBody>
         </p:sp>
       </p:grpSp>
+      <p:pic>
+        <p:nvPicPr>
+          <p:cNvPr id="5" name="Graphic 4">
+            <a:extLst>
+              <a:ext uri="{FF2B5EF4-FFF2-40B4-BE49-F238E27FC236}">
+                <a16:creationId xmlns:a16="http://schemas.microsoft.com/office/drawing/2014/main" id="{72D4F2BF-45F1-F1D5-A779-2C48D034B8A8}"/>
+              </a:ext>
+            </a:extLst>
+          </p:cNvPr>
+          <p:cNvPicPr>
+            <a:picLocks noChangeAspect="1"/>
+          </p:cNvPicPr>
+          <p:nvPr/>
+        </p:nvPicPr>
+        <p:blipFill>
+          <a:blip r:embed="rId2">
+            <a:extLst>
+              <a:ext uri="{28A0092B-C50C-407E-A947-70E740481C1C}">
+                <a14:useLocalDpi xmlns:a14="http://schemas.microsoft.com/office/drawing/2010/main" val="0"/>
+              </a:ext>
+              <a:ext uri="{96DAC541-7B7A-43D3-8B79-37D633B846F1}">
+                <asvg:svgBlip xmlns:asvg="http://schemas.microsoft.com/office/drawing/2016/SVG/main" r:embed="rId3"/>
+              </a:ext>
+            </a:extLst>
+          </a:blip>
+          <a:stretch>
+            <a:fillRect/>
+          </a:stretch>
+        </p:blipFill>
+        <p:spPr>
+          <a:xfrm>
+            <a:off x="0" y="0"/>
+            <a:ext cx="3054350" cy="3054350"/>
+          </a:xfrm>
+          <a:prstGeom prst="rect">
+            <a:avLst/>
+          </a:prstGeom>
+        </p:spPr>
+      </p:pic>
     </p:spTree>
     <p:extLst>
       <p:ext uri="{BB962C8B-B14F-4D97-AF65-F5344CB8AC3E}">
-        <p14:creationId xmlns:p14="http://schemas.microsoft.com/office/powerpoint/2010/main" val="560821162"/>
+        <p14:creationId xmlns:p14="http://schemas.microsoft.com/office/powerpoint/2010/main" val="110841472"/>
       </p:ext>
     </p:extLst>
   </p:cSld>

</xml_diff>

<commit_message>
Update logo Lightning fi-FI
</commit_message>
<xml_diff>
--- a/logo lightning network fi-FI/bitcoin logo lightning network fi-FI.pptx
+++ b/logo lightning network fi-FI/bitcoin logo lightning network fi-FI.pptx
@@ -5,7 +5,7 @@
     <p:sldMasterId id="2147483672" r:id="rId1"/>
   </p:sldMasterIdLst>
   <p:sldIdLst>
-    <p:sldId id="256" r:id="rId2"/>
+    <p:sldId id="263" r:id="rId2"/>
   </p:sldIdLst>
   <p:sldSz cx="9720263" cy="3240088"/>
   <p:notesSz cx="6858000" cy="9144000"/>
@@ -115,8 +115,7 @@
 <file path=ppt/revisionInfo.xml><?xml version="1.0" encoding="utf-8"?>
 <p1510:revInfo xmlns:a="http://schemas.openxmlformats.org/drawingml/2006/main" xmlns:r="http://schemas.openxmlformats.org/officeDocument/2006/relationships" xmlns:p1510="http://schemas.microsoft.com/office/powerpoint/2015/10/main">
   <p1510:revLst>
-    <p1510:client id="{3A57CA03-FE34-4A8E-A273-5AD7ABDF0FFB}" v="458" dt="2024-03-08T22:01:29.377"/>
-    <p1510:client id="{4ED1C821-59B5-4C36-800E-36BF6E3A404E}" v="19" dt="2024-03-09T04:13:07.696"/>
+    <p1510:client id="{4B49EF1C-EBB3-4E83-9F51-0353B7CA028B}" v="4" dt="2024-03-15T20:11:16.418"/>
   </p1510:revLst>
 </p1510:revInfo>
 </file>
@@ -124,586 +123,42 @@
 <file path=ppt/changesInfos/changesInfo1.xml><?xml version="1.0" encoding="utf-8"?>
 <pc:chgInfo xmlns:a="http://schemas.openxmlformats.org/drawingml/2006/main" xmlns:r="http://schemas.openxmlformats.org/officeDocument/2006/relationships" xmlns:ac="http://schemas.microsoft.com/office/drawing/2013/main/command" xmlns:pc="http://schemas.microsoft.com/office/powerpoint/2013/main/command">
   <pc:docChgLst>
-    <pc:chgData name="Tomi Lind" userId="73fe6e1701840021" providerId="LiveId" clId="{4ED1C821-59B5-4C36-800E-36BF6E3A404E}"/>
-    <pc:docChg chg="undo custSel modSld">
-      <pc:chgData name="Tomi Lind" userId="73fe6e1701840021" providerId="LiveId" clId="{4ED1C821-59B5-4C36-800E-36BF6E3A404E}" dt="2024-03-09T04:13:29.057" v="49" actId="14100"/>
+    <pc:chgData name="Tomi Lind" userId="73fe6e1701840021" providerId="LiveId" clId="{4B49EF1C-EBB3-4E83-9F51-0353B7CA028B}"/>
+    <pc:docChg chg="undo redo custSel modSld">
+      <pc:chgData name="Tomi Lind" userId="73fe6e1701840021" providerId="LiveId" clId="{4B49EF1C-EBB3-4E83-9F51-0353B7CA028B}" dt="2024-03-15T20:11:19.673" v="22" actId="255"/>
       <pc:docMkLst>
         <pc:docMk/>
       </pc:docMkLst>
-      <pc:sldChg chg="addSp delSp modSp mod">
-        <pc:chgData name="Tomi Lind" userId="73fe6e1701840021" providerId="LiveId" clId="{4ED1C821-59B5-4C36-800E-36BF6E3A404E}" dt="2024-03-09T04:13:29.057" v="49" actId="14100"/>
+      <pc:sldChg chg="modSp mod">
+        <pc:chgData name="Tomi Lind" userId="73fe6e1701840021" providerId="LiveId" clId="{4B49EF1C-EBB3-4E83-9F51-0353B7CA028B}" dt="2024-03-15T20:11:19.673" v="22" actId="255"/>
         <pc:sldMkLst>
           <pc:docMk/>
-          <pc:sldMk cId="560821162" sldId="256"/>
+          <pc:sldMk cId="110841472" sldId="263"/>
         </pc:sldMkLst>
         <pc:spChg chg="mod">
-          <ac:chgData name="Tomi Lind" userId="73fe6e1701840021" providerId="LiveId" clId="{4ED1C821-59B5-4C36-800E-36BF6E3A404E}" dt="2024-03-09T04:10:14.711" v="10" actId="1076"/>
+          <ac:chgData name="Tomi Lind" userId="73fe6e1701840021" providerId="LiveId" clId="{4B49EF1C-EBB3-4E83-9F51-0353B7CA028B}" dt="2024-03-15T20:11:16.418" v="20" actId="14100"/>
           <ac:spMkLst>
             <pc:docMk/>
-            <pc:sldMk cId="560821162" sldId="256"/>
-            <ac:spMk id="2" creationId="{84CD5194-FB3F-5711-99ED-23969B899BE0}"/>
-          </ac:spMkLst>
-        </pc:spChg>
-        <pc:spChg chg="mod">
-          <ac:chgData name="Tomi Lind" userId="73fe6e1701840021" providerId="LiveId" clId="{4ED1C821-59B5-4C36-800E-36BF6E3A404E}" dt="2024-03-09T04:11:59.604" v="40" actId="1076"/>
-          <ac:spMkLst>
-            <pc:docMk/>
-            <pc:sldMk cId="560821162" sldId="256"/>
+            <pc:sldMk cId="110841472" sldId="263"/>
             <ac:spMk id="3" creationId="{C404225F-4EB9-154C-370B-F266805E2500}"/>
           </ac:spMkLst>
         </pc:spChg>
         <pc:spChg chg="mod">
-          <ac:chgData name="Tomi Lind" userId="73fe6e1701840021" providerId="LiveId" clId="{4ED1C821-59B5-4C36-800E-36BF6E3A404E}" dt="2024-03-09T04:11:59.604" v="40" actId="1076"/>
+          <ac:chgData name="Tomi Lind" userId="73fe6e1701840021" providerId="LiveId" clId="{4B49EF1C-EBB3-4E83-9F51-0353B7CA028B}" dt="2024-03-15T20:11:19.673" v="22" actId="255"/>
           <ac:spMkLst>
             <pc:docMk/>
-            <pc:sldMk cId="560821162" sldId="256"/>
+            <pc:sldMk cId="110841472" sldId="263"/>
             <ac:spMk id="4" creationId="{6A27C49D-2631-B0BB-B113-6105C713D41F}"/>
           </ac:spMkLst>
         </pc:spChg>
-        <pc:spChg chg="mod">
-          <ac:chgData name="Tomi Lind" userId="73fe6e1701840021" providerId="LiveId" clId="{4ED1C821-59B5-4C36-800E-36BF6E3A404E}" dt="2024-03-09T04:10:14.711" v="10" actId="1076"/>
-          <ac:spMkLst>
-            <pc:docMk/>
-            <pc:sldMk cId="560821162" sldId="256"/>
-            <ac:spMk id="5" creationId="{2E00FE96-874C-182F-11E9-5A7A0FFEA93C}"/>
-          </ac:spMkLst>
-        </pc:spChg>
-        <pc:spChg chg="mod">
-          <ac:chgData name="Tomi Lind" userId="73fe6e1701840021" providerId="LiveId" clId="{4ED1C821-59B5-4C36-800E-36BF6E3A404E}" dt="2024-03-09T04:11:47.572" v="36" actId="27803"/>
-          <ac:spMkLst>
-            <pc:docMk/>
-            <pc:sldMk cId="560821162" sldId="256"/>
-            <ac:spMk id="10" creationId="{3A68FC89-E913-7E06-D846-C6489D43C8FE}"/>
-          </ac:spMkLst>
-        </pc:spChg>
-        <pc:spChg chg="mod">
-          <ac:chgData name="Tomi Lind" userId="73fe6e1701840021" providerId="LiveId" clId="{4ED1C821-59B5-4C36-800E-36BF6E3A404E}" dt="2024-03-09T04:11:47.572" v="36" actId="27803"/>
-          <ac:spMkLst>
-            <pc:docMk/>
-            <pc:sldMk cId="560821162" sldId="256"/>
-            <ac:spMk id="11" creationId="{4E5C6161-1249-EF1F-A582-EE7EF4EE7199}"/>
-          </ac:spMkLst>
-        </pc:spChg>
-        <pc:spChg chg="mod">
-          <ac:chgData name="Tomi Lind" userId="73fe6e1701840021" providerId="LiveId" clId="{4ED1C821-59B5-4C36-800E-36BF6E3A404E}" dt="2024-03-09T04:11:47.572" v="36" actId="27803"/>
-          <ac:spMkLst>
-            <pc:docMk/>
-            <pc:sldMk cId="560821162" sldId="256"/>
-            <ac:spMk id="12" creationId="{36B4DD18-52E7-DE61-DB00-CD6D9C6EA09E}"/>
-          </ac:spMkLst>
-        </pc:spChg>
-        <pc:spChg chg="mod">
-          <ac:chgData name="Tomi Lind" userId="73fe6e1701840021" providerId="LiveId" clId="{4ED1C821-59B5-4C36-800E-36BF6E3A404E}" dt="2024-03-09T04:11:47.572" v="36" actId="27803"/>
-          <ac:spMkLst>
-            <pc:docMk/>
-            <pc:sldMk cId="560821162" sldId="256"/>
-            <ac:spMk id="13" creationId="{D2F86060-6F9A-02A2-6542-2D8BA2DCF0C8}"/>
-          </ac:spMkLst>
-        </pc:spChg>
-        <pc:spChg chg="mod">
-          <ac:chgData name="Tomi Lind" userId="73fe6e1701840021" providerId="LiveId" clId="{4ED1C821-59B5-4C36-800E-36BF6E3A404E}" dt="2024-03-09T04:11:47.572" v="36" actId="27803"/>
-          <ac:spMkLst>
-            <pc:docMk/>
-            <pc:sldMk cId="560821162" sldId="256"/>
-            <ac:spMk id="14" creationId="{192EB200-4635-F814-9506-708AEDBC0F27}"/>
-          </ac:spMkLst>
-        </pc:spChg>
-        <pc:spChg chg="mod">
-          <ac:chgData name="Tomi Lind" userId="73fe6e1701840021" providerId="LiveId" clId="{4ED1C821-59B5-4C36-800E-36BF6E3A404E}" dt="2024-03-09T04:11:57.497" v="38" actId="27803"/>
-          <ac:spMkLst>
-            <pc:docMk/>
-            <pc:sldMk cId="560821162" sldId="256"/>
-            <ac:spMk id="16" creationId="{F8CD7592-C3DE-1DE5-2E5A-14ACAF7A5C74}"/>
-          </ac:spMkLst>
-        </pc:spChg>
-        <pc:spChg chg="mod">
-          <ac:chgData name="Tomi Lind" userId="73fe6e1701840021" providerId="LiveId" clId="{4ED1C821-59B5-4C36-800E-36BF6E3A404E}" dt="2024-03-09T04:11:57.497" v="38" actId="27803"/>
-          <ac:spMkLst>
-            <pc:docMk/>
-            <pc:sldMk cId="560821162" sldId="256"/>
-            <ac:spMk id="17" creationId="{0F1217EA-EBB1-7E11-788C-EAC23233C0DD}"/>
-          </ac:spMkLst>
-        </pc:spChg>
-        <pc:spChg chg="mod">
-          <ac:chgData name="Tomi Lind" userId="73fe6e1701840021" providerId="LiveId" clId="{4ED1C821-59B5-4C36-800E-36BF6E3A404E}" dt="2024-03-09T04:11:57.497" v="38" actId="27803"/>
-          <ac:spMkLst>
-            <pc:docMk/>
-            <pc:sldMk cId="560821162" sldId="256"/>
-            <ac:spMk id="18" creationId="{ABC651B1-516C-A218-AD57-555B4E8F826B}"/>
-          </ac:spMkLst>
-        </pc:spChg>
-        <pc:spChg chg="mod">
-          <ac:chgData name="Tomi Lind" userId="73fe6e1701840021" providerId="LiveId" clId="{4ED1C821-59B5-4C36-800E-36BF6E3A404E}" dt="2024-03-09T04:11:57.497" v="38" actId="27803"/>
-          <ac:spMkLst>
-            <pc:docMk/>
-            <pc:sldMk cId="560821162" sldId="256"/>
-            <ac:spMk id="19" creationId="{49C9B128-20B5-8739-31FE-102EFF8A88DA}"/>
-          </ac:spMkLst>
-        </pc:spChg>
-        <pc:spChg chg="mod">
-          <ac:chgData name="Tomi Lind" userId="73fe6e1701840021" providerId="LiveId" clId="{4ED1C821-59B5-4C36-800E-36BF6E3A404E}" dt="2024-03-09T04:11:57.497" v="38" actId="27803"/>
-          <ac:spMkLst>
-            <pc:docMk/>
-            <pc:sldMk cId="560821162" sldId="256"/>
-            <ac:spMk id="20" creationId="{4989DE69-A871-A8F3-05D4-49F4E329687F}"/>
-          </ac:spMkLst>
-        </pc:spChg>
-        <pc:spChg chg="mod">
-          <ac:chgData name="Tomi Lind" userId="73fe6e1701840021" providerId="LiveId" clId="{4ED1C821-59B5-4C36-800E-36BF6E3A404E}" dt="2024-03-09T04:10:14.711" v="10" actId="1076"/>
-          <ac:spMkLst>
-            <pc:docMk/>
-            <pc:sldMk cId="560821162" sldId="256"/>
-            <ac:spMk id="32" creationId="{90977182-506E-9CB2-B816-1C6014460D79}"/>
-          </ac:spMkLst>
-        </pc:spChg>
-        <pc:spChg chg="mod">
-          <ac:chgData name="Tomi Lind" userId="73fe6e1701840021" providerId="LiveId" clId="{4ED1C821-59B5-4C36-800E-36BF6E3A404E}" dt="2024-03-09T04:10:14.711" v="10" actId="1076"/>
-          <ac:spMkLst>
-            <pc:docMk/>
-            <pc:sldMk cId="560821162" sldId="256"/>
-            <ac:spMk id="33" creationId="{C4ABDBC1-2CF7-0F61-2138-3955A981D482}"/>
-          </ac:spMkLst>
-        </pc:spChg>
-        <pc:grpChg chg="add del mod">
-          <ac:chgData name="Tomi Lind" userId="73fe6e1701840021" providerId="LiveId" clId="{4ED1C821-59B5-4C36-800E-36BF6E3A404E}" dt="2024-03-09T04:11:47.572" v="36" actId="27803"/>
+        <pc:grpChg chg="mod">
+          <ac:chgData name="Tomi Lind" userId="73fe6e1701840021" providerId="LiveId" clId="{4B49EF1C-EBB3-4E83-9F51-0353B7CA028B}" dt="2024-03-15T20:11:16.418" v="20" actId="14100"/>
           <ac:grpSpMkLst>
             <pc:docMk/>
-            <pc:sldMk cId="560821162" sldId="256"/>
-            <ac:grpSpMk id="9" creationId="{027EECAD-A1E5-A3EE-5852-C294E9C34F2D}"/>
-          </ac:grpSpMkLst>
-        </pc:grpChg>
-        <pc:grpChg chg="add del mod">
-          <ac:chgData name="Tomi Lind" userId="73fe6e1701840021" providerId="LiveId" clId="{4ED1C821-59B5-4C36-800E-36BF6E3A404E}" dt="2024-03-09T04:11:57.497" v="38" actId="27803"/>
-          <ac:grpSpMkLst>
-            <pc:docMk/>
-            <pc:sldMk cId="560821162" sldId="256"/>
-            <ac:grpSpMk id="15" creationId="{93A8DA39-624B-B0DC-7B1A-CC752ACD7B53}"/>
-          </ac:grpSpMkLst>
-        </pc:grpChg>
-        <pc:grpChg chg="mod">
-          <ac:chgData name="Tomi Lind" userId="73fe6e1701840021" providerId="LiveId" clId="{4ED1C821-59B5-4C36-800E-36BF6E3A404E}" dt="2024-03-09T04:10:14.711" v="10" actId="1076"/>
-          <ac:grpSpMkLst>
-            <pc:docMk/>
-            <pc:sldMk cId="560821162" sldId="256"/>
-            <ac:grpSpMk id="31" creationId="{013ABD34-BE71-E760-7C47-BE4F4C8CAB31}"/>
-          </ac:grpSpMkLst>
-        </pc:grpChg>
-        <pc:grpChg chg="mod">
-          <ac:chgData name="Tomi Lind" userId="73fe6e1701840021" providerId="LiveId" clId="{4ED1C821-59B5-4C36-800E-36BF6E3A404E}" dt="2024-03-09T04:10:14.711" v="10" actId="1076"/>
-          <ac:grpSpMkLst>
-            <pc:docMk/>
-            <pc:sldMk cId="560821162" sldId="256"/>
-            <ac:grpSpMk id="34" creationId="{74851BA3-4668-3862-FD5C-DDC55608E934}"/>
-          </ac:grpSpMkLst>
-        </pc:grpChg>
-        <pc:grpChg chg="del mod">
-          <ac:chgData name="Tomi Lind" userId="73fe6e1701840021" providerId="LiveId" clId="{4ED1C821-59B5-4C36-800E-36BF6E3A404E}" dt="2024-03-09T04:10:16.135" v="11" actId="478"/>
-          <ac:grpSpMkLst>
-            <pc:docMk/>
-            <pc:sldMk cId="560821162" sldId="256"/>
-            <ac:grpSpMk id="35" creationId="{C9CCF0DF-962C-F968-2818-CE12BC5D887A}"/>
-          </ac:grpSpMkLst>
-        </pc:grpChg>
-        <pc:grpChg chg="mod">
-          <ac:chgData name="Tomi Lind" userId="73fe6e1701840021" providerId="LiveId" clId="{4ED1C821-59B5-4C36-800E-36BF6E3A404E}" dt="2024-03-09T04:11:59.604" v="40" actId="1076"/>
-          <ac:grpSpMkLst>
-            <pc:docMk/>
-            <pc:sldMk cId="560821162" sldId="256"/>
+            <pc:sldMk cId="110841472" sldId="263"/>
             <ac:grpSpMk id="38" creationId="{903AFFB8-7333-CA7E-3061-936D3CC39B64}"/>
           </ac:grpSpMkLst>
         </pc:grpChg>
-        <pc:picChg chg="add del mod">
-          <ac:chgData name="Tomi Lind" userId="73fe6e1701840021" providerId="LiveId" clId="{4ED1C821-59B5-4C36-800E-36BF6E3A404E}" dt="2024-03-09T04:09:30.916" v="1" actId="21"/>
-          <ac:picMkLst>
-            <pc:docMk/>
-            <pc:sldMk cId="560821162" sldId="256"/>
-            <ac:picMk id="7" creationId="{C8C7D250-F7FA-F5AD-F725-AF2E29BC85E5}"/>
-          </ac:picMkLst>
-        </pc:picChg>
-        <pc:picChg chg="add del mod ord">
-          <ac:chgData name="Tomi Lind" userId="73fe6e1701840021" providerId="LiveId" clId="{4ED1C821-59B5-4C36-800E-36BF6E3A404E}" dt="2024-03-09T04:13:29.057" v="49" actId="14100"/>
-          <ac:picMkLst>
-            <pc:docMk/>
-            <pc:sldMk cId="560821162" sldId="256"/>
-            <ac:picMk id="8" creationId="{C8C7D250-F7FA-F5AD-F725-AF2E29BC85E5}"/>
-          </ac:picMkLst>
-        </pc:picChg>
-      </pc:sldChg>
-    </pc:docChg>
-  </pc:docChgLst>
-  <pc:docChgLst>
-    <pc:chgData name="Tomi Lind" userId="73fe6e1701840021" providerId="LiveId" clId="{3A57CA03-FE34-4A8E-A273-5AD7ABDF0FFB}"/>
-    <pc:docChg chg="undo custSel addSld modSld">
-      <pc:chgData name="Tomi Lind" userId="73fe6e1701840021" providerId="LiveId" clId="{3A57CA03-FE34-4A8E-A273-5AD7ABDF0FFB}" dt="2024-03-08T22:01:44.533" v="594" actId="255"/>
-      <pc:docMkLst>
-        <pc:docMk/>
-      </pc:docMkLst>
-      <pc:sldChg chg="addSp delSp modSp new mod modClrScheme chgLayout">
-        <pc:chgData name="Tomi Lind" userId="73fe6e1701840021" providerId="LiveId" clId="{3A57CA03-FE34-4A8E-A273-5AD7ABDF0FFB}" dt="2024-03-08T22:01:44.533" v="594" actId="255"/>
-        <pc:sldMkLst>
-          <pc:docMk/>
-          <pc:sldMk cId="560821162" sldId="256"/>
-        </pc:sldMkLst>
-        <pc:spChg chg="add mod topLvl">
-          <ac:chgData name="Tomi Lind" userId="73fe6e1701840021" providerId="LiveId" clId="{3A57CA03-FE34-4A8E-A273-5AD7ABDF0FFB}" dt="2024-03-08T22:01:29.377" v="592" actId="14100"/>
-          <ac:spMkLst>
-            <pc:docMk/>
-            <pc:sldMk cId="560821162" sldId="256"/>
-            <ac:spMk id="2" creationId="{84CD5194-FB3F-5711-99ED-23969B899BE0}"/>
-          </ac:spMkLst>
-        </pc:spChg>
-        <pc:spChg chg="del">
-          <ac:chgData name="Tomi Lind" userId="73fe6e1701840021" providerId="LiveId" clId="{3A57CA03-FE34-4A8E-A273-5AD7ABDF0FFB}" dt="2024-03-08T20:34:52.336" v="1" actId="700"/>
-          <ac:spMkLst>
-            <pc:docMk/>
-            <pc:sldMk cId="560821162" sldId="256"/>
-            <ac:spMk id="2" creationId="{D74D489C-18CC-45E2-E482-AF67CE36666A}"/>
-          </ac:spMkLst>
-        </pc:spChg>
-        <pc:spChg chg="add mod topLvl">
-          <ac:chgData name="Tomi Lind" userId="73fe6e1701840021" providerId="LiveId" clId="{3A57CA03-FE34-4A8E-A273-5AD7ABDF0FFB}" dt="2024-03-08T22:01:44.533" v="594" actId="255"/>
-          <ac:spMkLst>
-            <pc:docMk/>
-            <pc:sldMk cId="560821162" sldId="256"/>
-            <ac:spMk id="3" creationId="{C404225F-4EB9-154C-370B-F266805E2500}"/>
-          </ac:spMkLst>
-        </pc:spChg>
-        <pc:spChg chg="del">
-          <ac:chgData name="Tomi Lind" userId="73fe6e1701840021" providerId="LiveId" clId="{3A57CA03-FE34-4A8E-A273-5AD7ABDF0FFB}" dt="2024-03-08T20:34:52.336" v="1" actId="700"/>
-          <ac:spMkLst>
-            <pc:docMk/>
-            <pc:sldMk cId="560821162" sldId="256"/>
-            <ac:spMk id="3" creationId="{D1D82D1A-E70D-8176-10CF-A48E4A1B525C}"/>
-          </ac:spMkLst>
-        </pc:spChg>
-        <pc:spChg chg="add mod topLvl">
-          <ac:chgData name="Tomi Lind" userId="73fe6e1701840021" providerId="LiveId" clId="{3A57CA03-FE34-4A8E-A273-5AD7ABDF0FFB}" dt="2024-03-08T22:00:25.787" v="587" actId="14100"/>
-          <ac:spMkLst>
-            <pc:docMk/>
-            <pc:sldMk cId="560821162" sldId="256"/>
-            <ac:spMk id="4" creationId="{6A27C49D-2631-B0BB-B113-6105C713D41F}"/>
-          </ac:spMkLst>
-        </pc:spChg>
-        <pc:spChg chg="add mod topLvl">
-          <ac:chgData name="Tomi Lind" userId="73fe6e1701840021" providerId="LiveId" clId="{3A57CA03-FE34-4A8E-A273-5AD7ABDF0FFB}" dt="2024-03-08T22:01:29.377" v="592" actId="14100"/>
-          <ac:spMkLst>
-            <pc:docMk/>
-            <pc:sldMk cId="560821162" sldId="256"/>
-            <ac:spMk id="5" creationId="{2E00FE96-874C-182F-11E9-5A7A0FFEA93C}"/>
-          </ac:spMkLst>
-        </pc:spChg>
-        <pc:spChg chg="mod">
-          <ac:chgData name="Tomi Lind" userId="73fe6e1701840021" providerId="LiveId" clId="{3A57CA03-FE34-4A8E-A273-5AD7ABDF0FFB}" dt="2024-03-08T20:38:12.789" v="5" actId="27803"/>
-          <ac:spMkLst>
-            <pc:docMk/>
-            <pc:sldMk cId="560821162" sldId="256"/>
-            <ac:spMk id="7" creationId="{4A2D1A36-65DE-889E-67E4-43469508B3AA}"/>
-          </ac:spMkLst>
-        </pc:spChg>
-        <pc:spChg chg="add mod">
-          <ac:chgData name="Tomi Lind" userId="73fe6e1701840021" providerId="LiveId" clId="{3A57CA03-FE34-4A8E-A273-5AD7ABDF0FFB}" dt="2024-03-08T21:20:51.516" v="123" actId="571"/>
-          <ac:spMkLst>
-            <pc:docMk/>
-            <pc:sldMk cId="560821162" sldId="256"/>
-            <ac:spMk id="8" creationId="{77C2010D-67D5-06D0-9D45-67E850B1B2A2}"/>
-          </ac:spMkLst>
-        </pc:spChg>
-        <pc:spChg chg="mod">
-          <ac:chgData name="Tomi Lind" userId="73fe6e1701840021" providerId="LiveId" clId="{3A57CA03-FE34-4A8E-A273-5AD7ABDF0FFB}" dt="2024-03-08T20:38:12.789" v="5" actId="27803"/>
-          <ac:spMkLst>
-            <pc:docMk/>
-            <pc:sldMk cId="560821162" sldId="256"/>
-            <ac:spMk id="8" creationId="{A7A81906-31C8-C5A7-F7A1-E15F017C1D94}"/>
-          </ac:spMkLst>
-        </pc:spChg>
-        <pc:spChg chg="mod">
-          <ac:chgData name="Tomi Lind" userId="73fe6e1701840021" providerId="LiveId" clId="{3A57CA03-FE34-4A8E-A273-5AD7ABDF0FFB}" dt="2024-03-08T20:38:12.789" v="5" actId="27803"/>
-          <ac:spMkLst>
-            <pc:docMk/>
-            <pc:sldMk cId="560821162" sldId="256"/>
-            <ac:spMk id="9" creationId="{1B584128-AB83-1F7A-C5A3-356AA175D209}"/>
-          </ac:spMkLst>
-        </pc:spChg>
-        <pc:spChg chg="mod">
-          <ac:chgData name="Tomi Lind" userId="73fe6e1701840021" providerId="LiveId" clId="{3A57CA03-FE34-4A8E-A273-5AD7ABDF0FFB}" dt="2024-03-08T20:38:12.789" v="5" actId="27803"/>
-          <ac:spMkLst>
-            <pc:docMk/>
-            <pc:sldMk cId="560821162" sldId="256"/>
-            <ac:spMk id="10" creationId="{BE4B29D0-3F99-3D4A-EB5B-5EBFB4132E6D}"/>
-          </ac:spMkLst>
-        </pc:spChg>
-        <pc:spChg chg="mod">
-          <ac:chgData name="Tomi Lind" userId="73fe6e1701840021" providerId="LiveId" clId="{3A57CA03-FE34-4A8E-A273-5AD7ABDF0FFB}" dt="2024-03-08T20:38:12.789" v="5" actId="27803"/>
-          <ac:spMkLst>
-            <pc:docMk/>
-            <pc:sldMk cId="560821162" sldId="256"/>
-            <ac:spMk id="11" creationId="{E6FC11E1-53F9-8CAA-7BB7-D98555CE6A38}"/>
-          </ac:spMkLst>
-        </pc:spChg>
-        <pc:spChg chg="mod">
-          <ac:chgData name="Tomi Lind" userId="73fe6e1701840021" providerId="LiveId" clId="{3A57CA03-FE34-4A8E-A273-5AD7ABDF0FFB}" dt="2024-03-08T20:38:12.789" v="5" actId="27803"/>
-          <ac:spMkLst>
-            <pc:docMk/>
-            <pc:sldMk cId="560821162" sldId="256"/>
-            <ac:spMk id="12" creationId="{9B3E7586-A014-32AC-A147-EBB2B62A909F}"/>
-          </ac:spMkLst>
-        </pc:spChg>
-        <pc:spChg chg="mod">
-          <ac:chgData name="Tomi Lind" userId="73fe6e1701840021" providerId="LiveId" clId="{3A57CA03-FE34-4A8E-A273-5AD7ABDF0FFB}" dt="2024-03-08T20:38:12.789" v="5" actId="27803"/>
-          <ac:spMkLst>
-            <pc:docMk/>
-            <pc:sldMk cId="560821162" sldId="256"/>
-            <ac:spMk id="13" creationId="{FDCF9538-AC79-0B35-A708-CF5C73821F80}"/>
-          </ac:spMkLst>
-        </pc:spChg>
-        <pc:spChg chg="mod">
-          <ac:chgData name="Tomi Lind" userId="73fe6e1701840021" providerId="LiveId" clId="{3A57CA03-FE34-4A8E-A273-5AD7ABDF0FFB}" dt="2024-03-08T20:38:12.789" v="5" actId="27803"/>
-          <ac:spMkLst>
-            <pc:docMk/>
-            <pc:sldMk cId="560821162" sldId="256"/>
-            <ac:spMk id="14" creationId="{2D5A1DE2-1181-BB60-736F-FE5E19FB1531}"/>
-          </ac:spMkLst>
-        </pc:spChg>
-        <pc:spChg chg="mod">
-          <ac:chgData name="Tomi Lind" userId="73fe6e1701840021" providerId="LiveId" clId="{3A57CA03-FE34-4A8E-A273-5AD7ABDF0FFB}" dt="2024-03-08T20:38:12.789" v="5" actId="27803"/>
-          <ac:spMkLst>
-            <pc:docMk/>
-            <pc:sldMk cId="560821162" sldId="256"/>
-            <ac:spMk id="15" creationId="{C452658A-1AB6-AEAD-BD99-4E1F3CC839B8}"/>
-          </ac:spMkLst>
-        </pc:spChg>
-        <pc:spChg chg="add del mod">
-          <ac:chgData name="Tomi Lind" userId="73fe6e1701840021" providerId="LiveId" clId="{3A57CA03-FE34-4A8E-A273-5AD7ABDF0FFB}" dt="2024-03-08T21:31:07.334" v="345" actId="478"/>
-          <ac:spMkLst>
-            <pc:docMk/>
-            <pc:sldMk cId="560821162" sldId="256"/>
-            <ac:spMk id="18" creationId="{B1DEB2EA-9FFF-0284-B287-11D496F2142D}"/>
-          </ac:spMkLst>
-        </pc:spChg>
-        <pc:spChg chg="mod">
-          <ac:chgData name="Tomi Lind" userId="73fe6e1701840021" providerId="LiveId" clId="{3A57CA03-FE34-4A8E-A273-5AD7ABDF0FFB}" dt="2024-03-08T21:34:20.214" v="381" actId="27803"/>
-          <ac:spMkLst>
-            <pc:docMk/>
-            <pc:sldMk cId="560821162" sldId="256"/>
-            <ac:spMk id="22" creationId="{0C6CCE44-FCDC-5B2B-CE47-67815D953A2C}"/>
-          </ac:spMkLst>
-        </pc:spChg>
-        <pc:spChg chg="mod">
-          <ac:chgData name="Tomi Lind" userId="73fe6e1701840021" providerId="LiveId" clId="{3A57CA03-FE34-4A8E-A273-5AD7ABDF0FFB}" dt="2024-03-08T21:40:27.167" v="385" actId="207"/>
-          <ac:spMkLst>
-            <pc:docMk/>
-            <pc:sldMk cId="560821162" sldId="256"/>
-            <ac:spMk id="23" creationId="{4005B098-46E0-D53B-F0FB-02B389352F1B}"/>
-          </ac:spMkLst>
-        </pc:spChg>
-        <pc:spChg chg="mod ord">
-          <ac:chgData name="Tomi Lind" userId="73fe6e1701840021" providerId="LiveId" clId="{3A57CA03-FE34-4A8E-A273-5AD7ABDF0FFB}" dt="2024-03-08T21:41:06.397" v="399" actId="167"/>
-          <ac:spMkLst>
-            <pc:docMk/>
-            <pc:sldMk cId="560821162" sldId="256"/>
-            <ac:spMk id="25" creationId="{8B2E1E1A-0229-19E5-13B4-F4A2BE869034}"/>
-          </ac:spMkLst>
-        </pc:spChg>
-        <pc:spChg chg="mod">
-          <ac:chgData name="Tomi Lind" userId="73fe6e1701840021" providerId="LiveId" clId="{3A57CA03-FE34-4A8E-A273-5AD7ABDF0FFB}" dt="2024-03-08T21:40:38.055" v="387" actId="27803"/>
-          <ac:spMkLst>
-            <pc:docMk/>
-            <pc:sldMk cId="560821162" sldId="256"/>
-            <ac:spMk id="26" creationId="{00EA093A-D71D-6F35-9C25-31291EBE2763}"/>
-          </ac:spMkLst>
-        </pc:spChg>
-        <pc:spChg chg="mod">
-          <ac:chgData name="Tomi Lind" userId="73fe6e1701840021" providerId="LiveId" clId="{3A57CA03-FE34-4A8E-A273-5AD7ABDF0FFB}" dt="2024-03-08T21:41:16.332" v="402" actId="27803"/>
-          <ac:spMkLst>
-            <pc:docMk/>
-            <pc:sldMk cId="560821162" sldId="256"/>
-            <ac:spMk id="28" creationId="{6533F810-7E84-71C0-9D8E-ABF1AB63A479}"/>
-          </ac:spMkLst>
-        </pc:spChg>
-        <pc:spChg chg="mod">
-          <ac:chgData name="Tomi Lind" userId="73fe6e1701840021" providerId="LiveId" clId="{3A57CA03-FE34-4A8E-A273-5AD7ABDF0FFB}" dt="2024-03-08T21:41:16.332" v="402" actId="27803"/>
-          <ac:spMkLst>
-            <pc:docMk/>
-            <pc:sldMk cId="560821162" sldId="256"/>
-            <ac:spMk id="29" creationId="{5E83E7DB-6FC4-583D-F6EF-AAB1C550DFB5}"/>
-          </ac:spMkLst>
-        </pc:spChg>
-        <pc:spChg chg="mod">
-          <ac:chgData name="Tomi Lind" userId="73fe6e1701840021" providerId="LiveId" clId="{3A57CA03-FE34-4A8E-A273-5AD7ABDF0FFB}" dt="2024-03-08T22:01:29.377" v="592" actId="14100"/>
-          <ac:spMkLst>
-            <pc:docMk/>
-            <pc:sldMk cId="560821162" sldId="256"/>
-            <ac:spMk id="32" creationId="{90977182-506E-9CB2-B816-1C6014460D79}"/>
-          </ac:spMkLst>
-        </pc:spChg>
-        <pc:spChg chg="mod">
-          <ac:chgData name="Tomi Lind" userId="73fe6e1701840021" providerId="LiveId" clId="{3A57CA03-FE34-4A8E-A273-5AD7ABDF0FFB}" dt="2024-03-08T22:01:29.377" v="592" actId="14100"/>
-          <ac:spMkLst>
-            <pc:docMk/>
-            <pc:sldMk cId="560821162" sldId="256"/>
-            <ac:spMk id="33" creationId="{C4ABDBC1-2CF7-0F61-2138-3955A981D482}"/>
-          </ac:spMkLst>
-        </pc:spChg>
-        <pc:grpChg chg="del mod">
-          <ac:chgData name="Tomi Lind" userId="73fe6e1701840021" providerId="LiveId" clId="{3A57CA03-FE34-4A8E-A273-5AD7ABDF0FFB}" dt="2024-03-08T20:48:31.521" v="6" actId="478"/>
-          <ac:grpSpMkLst>
-            <pc:docMk/>
-            <pc:sldMk cId="560821162" sldId="256"/>
-            <ac:grpSpMk id="6" creationId="{226A0A8B-10A4-89C7-DD7E-88FB21269AF0}"/>
-          </ac:grpSpMkLst>
-        </pc:grpChg>
-        <pc:grpChg chg="add mod">
-          <ac:chgData name="Tomi Lind" userId="73fe6e1701840021" providerId="LiveId" clId="{3A57CA03-FE34-4A8E-A273-5AD7ABDF0FFB}" dt="2024-03-08T21:06:33.471" v="17" actId="338"/>
-          <ac:grpSpMkLst>
-            <pc:docMk/>
-            <pc:sldMk cId="560821162" sldId="256"/>
-            <ac:grpSpMk id="6" creationId="{B6FCDFF4-2038-7CCD-6C89-EEB405C14146}"/>
-          </ac:grpSpMkLst>
-        </pc:grpChg>
-        <pc:grpChg chg="add mod">
-          <ac:chgData name="Tomi Lind" userId="73fe6e1701840021" providerId="LiveId" clId="{3A57CA03-FE34-4A8E-A273-5AD7ABDF0FFB}" dt="2024-03-08T21:08:17.710" v="63" actId="164"/>
-          <ac:grpSpMkLst>
-            <pc:docMk/>
-            <pc:sldMk cId="560821162" sldId="256"/>
-            <ac:grpSpMk id="7" creationId="{54B96A89-AF9E-EA05-2DA1-839208FFC0BF}"/>
-          </ac:grpSpMkLst>
-        </pc:grpChg>
-        <pc:grpChg chg="add del mod">
-          <ac:chgData name="Tomi Lind" userId="73fe6e1701840021" providerId="LiveId" clId="{3A57CA03-FE34-4A8E-A273-5AD7ABDF0FFB}" dt="2024-03-08T21:24:25.623" v="273" actId="165"/>
-          <ac:grpSpMkLst>
-            <pc:docMk/>
-            <pc:sldMk cId="560821162" sldId="256"/>
-            <ac:grpSpMk id="11" creationId="{189B4EEE-38A1-2937-346A-CBEBD95A7904}"/>
-          </ac:grpSpMkLst>
-        </pc:grpChg>
-        <pc:grpChg chg="add del mod">
-          <ac:chgData name="Tomi Lind" userId="73fe6e1701840021" providerId="LiveId" clId="{3A57CA03-FE34-4A8E-A273-5AD7ABDF0FFB}" dt="2024-03-08T20:54:19.051" v="10" actId="165"/>
-          <ac:grpSpMkLst>
-            <pc:docMk/>
-            <pc:sldMk cId="560821162" sldId="256"/>
-            <ac:grpSpMk id="16" creationId="{01ED2AB9-FA4F-3125-A099-136AC96BF39C}"/>
-          </ac:grpSpMkLst>
-        </pc:grpChg>
-        <pc:grpChg chg="add mod">
-          <ac:chgData name="Tomi Lind" userId="73fe6e1701840021" providerId="LiveId" clId="{3A57CA03-FE34-4A8E-A273-5AD7ABDF0FFB}" dt="2024-03-08T21:31:25.858" v="349" actId="338"/>
-          <ac:grpSpMkLst>
-            <pc:docMk/>
-            <pc:sldMk cId="560821162" sldId="256"/>
-            <ac:grpSpMk id="19" creationId="{5663F353-37A1-317E-3B3F-E20D5602DDC7}"/>
-          </ac:grpSpMkLst>
-        </pc:grpChg>
-        <pc:grpChg chg="add mod">
-          <ac:chgData name="Tomi Lind" userId="73fe6e1701840021" providerId="LiveId" clId="{3A57CA03-FE34-4A8E-A273-5AD7ABDF0FFB}" dt="2024-03-08T21:32:27.803" v="359" actId="164"/>
-          <ac:grpSpMkLst>
-            <pc:docMk/>
-            <pc:sldMk cId="560821162" sldId="256"/>
-            <ac:grpSpMk id="20" creationId="{BE7061CB-060F-11A6-E7BC-D0A18973CC27}"/>
-          </ac:grpSpMkLst>
-        </pc:grpChg>
-        <pc:grpChg chg="mod">
-          <ac:chgData name="Tomi Lind" userId="73fe6e1701840021" providerId="LiveId" clId="{3A57CA03-FE34-4A8E-A273-5AD7ABDF0FFB}" dt="2024-03-08T21:34:20.214" v="381" actId="27803"/>
-          <ac:grpSpMkLst>
-            <pc:docMk/>
-            <pc:sldMk cId="560821162" sldId="256"/>
-            <ac:grpSpMk id="21" creationId="{FD5AFF69-1E83-9E08-FF8E-6085B082E210}"/>
-          </ac:grpSpMkLst>
-        </pc:grpChg>
-        <pc:grpChg chg="mod">
-          <ac:chgData name="Tomi Lind" userId="73fe6e1701840021" providerId="LiveId" clId="{3A57CA03-FE34-4A8E-A273-5AD7ABDF0FFB}" dt="2024-03-08T21:40:38.055" v="387" actId="27803"/>
-          <ac:grpSpMkLst>
-            <pc:docMk/>
-            <pc:sldMk cId="560821162" sldId="256"/>
-            <ac:grpSpMk id="24" creationId="{A96D4881-75E9-3E45-78C7-68836F7E3B95}"/>
-          </ac:grpSpMkLst>
-        </pc:grpChg>
-        <pc:grpChg chg="mod">
-          <ac:chgData name="Tomi Lind" userId="73fe6e1701840021" providerId="LiveId" clId="{3A57CA03-FE34-4A8E-A273-5AD7ABDF0FFB}" dt="2024-03-08T21:41:16.332" v="402" actId="27803"/>
-          <ac:grpSpMkLst>
-            <pc:docMk/>
-            <pc:sldMk cId="560821162" sldId="256"/>
-            <ac:grpSpMk id="27" creationId="{E4F9B0F1-A5E1-10A3-17F5-D9CDF5C22700}"/>
-          </ac:grpSpMkLst>
-        </pc:grpChg>
-        <pc:grpChg chg="add del mod">
-          <ac:chgData name="Tomi Lind" userId="73fe6e1701840021" providerId="LiveId" clId="{3A57CA03-FE34-4A8E-A273-5AD7ABDF0FFB}" dt="2024-03-08T21:41:38.420" v="410" actId="165"/>
-          <ac:grpSpMkLst>
-            <pc:docMk/>
-            <pc:sldMk cId="560821162" sldId="256"/>
-            <ac:grpSpMk id="30" creationId="{72DEFFE1-8C7D-7E23-81D7-733DBEED64DE}"/>
-          </ac:grpSpMkLst>
-        </pc:grpChg>
-        <pc:grpChg chg="mod ord">
-          <ac:chgData name="Tomi Lind" userId="73fe6e1701840021" providerId="LiveId" clId="{3A57CA03-FE34-4A8E-A273-5AD7ABDF0FFB}" dt="2024-03-08T22:01:29.377" v="592" actId="14100"/>
-          <ac:grpSpMkLst>
-            <pc:docMk/>
-            <pc:sldMk cId="560821162" sldId="256"/>
-            <ac:grpSpMk id="31" creationId="{013ABD34-BE71-E760-7C47-BE4F4C8CAB31}"/>
-          </ac:grpSpMkLst>
-        </pc:grpChg>
-        <pc:grpChg chg="add mod">
-          <ac:chgData name="Tomi Lind" userId="73fe6e1701840021" providerId="LiveId" clId="{3A57CA03-FE34-4A8E-A273-5AD7ABDF0FFB}" dt="2024-03-08T22:01:29.377" v="592" actId="14100"/>
-          <ac:grpSpMkLst>
-            <pc:docMk/>
-            <pc:sldMk cId="560821162" sldId="256"/>
-            <ac:grpSpMk id="34" creationId="{74851BA3-4668-3862-FD5C-DDC55608E934}"/>
-          </ac:grpSpMkLst>
-        </pc:grpChg>
-        <pc:grpChg chg="add mod">
-          <ac:chgData name="Tomi Lind" userId="73fe6e1701840021" providerId="LiveId" clId="{3A57CA03-FE34-4A8E-A273-5AD7ABDF0FFB}" dt="2024-03-08T22:01:29.377" v="592" actId="14100"/>
-          <ac:grpSpMkLst>
-            <pc:docMk/>
-            <pc:sldMk cId="560821162" sldId="256"/>
-            <ac:grpSpMk id="35" creationId="{C9CCF0DF-962C-F968-2818-CE12BC5D887A}"/>
-          </ac:grpSpMkLst>
-        </pc:grpChg>
-        <pc:grpChg chg="add mod">
-          <ac:chgData name="Tomi Lind" userId="73fe6e1701840021" providerId="LiveId" clId="{3A57CA03-FE34-4A8E-A273-5AD7ABDF0FFB}" dt="2024-03-08T22:00:25.787" v="587" actId="14100"/>
-          <ac:grpSpMkLst>
-            <pc:docMk/>
-            <pc:sldMk cId="560821162" sldId="256"/>
-            <ac:grpSpMk id="38" creationId="{903AFFB8-7333-CA7E-3061-936D3CC39B64}"/>
-          </ac:grpSpMkLst>
-        </pc:grpChg>
-        <pc:picChg chg="add del mod">
-          <ac:chgData name="Tomi Lind" userId="73fe6e1701840021" providerId="LiveId" clId="{3A57CA03-FE34-4A8E-A273-5AD7ABDF0FFB}" dt="2024-03-08T20:38:12.789" v="5" actId="27803"/>
-          <ac:picMkLst>
-            <pc:docMk/>
-            <pc:sldMk cId="560821162" sldId="256"/>
-            <ac:picMk id="5" creationId="{A29684E8-618B-975B-7E0E-96EDE2D25C7C}"/>
-          </ac:picMkLst>
-        </pc:picChg>
-        <pc:picChg chg="add del mod ord topLvl">
-          <ac:chgData name="Tomi Lind" userId="73fe6e1701840021" providerId="LiveId" clId="{3A57CA03-FE34-4A8E-A273-5AD7ABDF0FFB}" dt="2024-03-08T21:42:18.403" v="416" actId="27803"/>
-          <ac:picMkLst>
-            <pc:docMk/>
-            <pc:sldMk cId="560821162" sldId="256"/>
-            <ac:picMk id="10" creationId="{D733FEEF-AFD6-0682-E791-395D8EC3772D}"/>
-          </ac:picMkLst>
-        </pc:picChg>
-        <pc:picChg chg="add del mod ord modCrop">
-          <ac:chgData name="Tomi Lind" userId="73fe6e1701840021" providerId="LiveId" clId="{3A57CA03-FE34-4A8E-A273-5AD7ABDF0FFB}" dt="2024-03-08T22:01:02.253" v="590" actId="478"/>
-          <ac:picMkLst>
-            <pc:docMk/>
-            <pc:sldMk cId="560821162" sldId="256"/>
-            <ac:picMk id="37" creationId="{904A3F71-B751-AD23-ADBD-6FC7C53D7556}"/>
-          </ac:picMkLst>
-        </pc:picChg>
-        <pc:cxnChg chg="add del mod">
-          <ac:chgData name="Tomi Lind" userId="73fe6e1701840021" providerId="LiveId" clId="{3A57CA03-FE34-4A8E-A273-5AD7ABDF0FFB}" dt="2024-03-08T21:31:11.207" v="347" actId="478"/>
-          <ac:cxnSpMkLst>
-            <pc:docMk/>
-            <pc:sldMk cId="560821162" sldId="256"/>
-            <ac:cxnSpMk id="13" creationId="{1DBC66FE-F42E-BFFC-233C-A209AA3FA653}"/>
-          </ac:cxnSpMkLst>
-        </pc:cxnChg>
-        <pc:cxnChg chg="add del mod">
-          <ac:chgData name="Tomi Lind" userId="73fe6e1701840021" providerId="LiveId" clId="{3A57CA03-FE34-4A8E-A273-5AD7ABDF0FFB}" dt="2024-03-08T21:31:10.194" v="346" actId="478"/>
-          <ac:cxnSpMkLst>
-            <pc:docMk/>
-            <pc:sldMk cId="560821162" sldId="256"/>
-            <ac:cxnSpMk id="17" creationId="{5C9DB851-70ED-5497-D11D-A59F8BD022B2}"/>
-          </ac:cxnSpMkLst>
-        </pc:cxnChg>
       </pc:sldChg>
     </pc:docChg>
   </pc:docChgLst>
@@ -841,7 +296,7 @@
           <a:p>
             <a:fld id="{75D0A277-1334-4236-85D9-B2D317AA20BB}" type="datetimeFigureOut">
               <a:rPr lang="en-FI" smtClean="0"/>
-              <a:t>09/03/2024</a:t>
+              <a:t>15/03/2024</a:t>
             </a:fld>
             <a:endParaRPr lang="en-FI"/>
           </a:p>
@@ -1011,7 +466,7 @@
           <a:p>
             <a:fld id="{75D0A277-1334-4236-85D9-B2D317AA20BB}" type="datetimeFigureOut">
               <a:rPr lang="en-FI" smtClean="0"/>
-              <a:t>09/03/2024</a:t>
+              <a:t>15/03/2024</a:t>
             </a:fld>
             <a:endParaRPr lang="en-FI"/>
           </a:p>
@@ -1191,7 +646,7 @@
           <a:p>
             <a:fld id="{75D0A277-1334-4236-85D9-B2D317AA20BB}" type="datetimeFigureOut">
               <a:rPr lang="en-FI" smtClean="0"/>
-              <a:t>09/03/2024</a:t>
+              <a:t>15/03/2024</a:t>
             </a:fld>
             <a:endParaRPr lang="en-FI"/>
           </a:p>
@@ -1361,7 +816,7 @@
           <a:p>
             <a:fld id="{75D0A277-1334-4236-85D9-B2D317AA20BB}" type="datetimeFigureOut">
               <a:rPr lang="en-FI" smtClean="0"/>
-              <a:t>09/03/2024</a:t>
+              <a:t>15/03/2024</a:t>
             </a:fld>
             <a:endParaRPr lang="en-FI"/>
           </a:p>
@@ -1607,7 +1062,7 @@
           <a:p>
             <a:fld id="{75D0A277-1334-4236-85D9-B2D317AA20BB}" type="datetimeFigureOut">
               <a:rPr lang="en-FI" smtClean="0"/>
-              <a:t>09/03/2024</a:t>
+              <a:t>15/03/2024</a:t>
             </a:fld>
             <a:endParaRPr lang="en-FI"/>
           </a:p>
@@ -1839,7 +1294,7 @@
           <a:p>
             <a:fld id="{75D0A277-1334-4236-85D9-B2D317AA20BB}" type="datetimeFigureOut">
               <a:rPr lang="en-FI" smtClean="0"/>
-              <a:t>09/03/2024</a:t>
+              <a:t>15/03/2024</a:t>
             </a:fld>
             <a:endParaRPr lang="en-FI"/>
           </a:p>
@@ -2206,7 +1661,7 @@
           <a:p>
             <a:fld id="{75D0A277-1334-4236-85D9-B2D317AA20BB}" type="datetimeFigureOut">
               <a:rPr lang="en-FI" smtClean="0"/>
-              <a:t>09/03/2024</a:t>
+              <a:t>15/03/2024</a:t>
             </a:fld>
             <a:endParaRPr lang="en-FI"/>
           </a:p>
@@ -2324,7 +1779,7 @@
           <a:p>
             <a:fld id="{75D0A277-1334-4236-85D9-B2D317AA20BB}" type="datetimeFigureOut">
               <a:rPr lang="en-FI" smtClean="0"/>
-              <a:t>09/03/2024</a:t>
+              <a:t>15/03/2024</a:t>
             </a:fld>
             <a:endParaRPr lang="en-FI"/>
           </a:p>
@@ -2419,7 +1874,7 @@
           <a:p>
             <a:fld id="{75D0A277-1334-4236-85D9-B2D317AA20BB}" type="datetimeFigureOut">
               <a:rPr lang="en-FI" smtClean="0"/>
-              <a:t>09/03/2024</a:t>
+              <a:t>15/03/2024</a:t>
             </a:fld>
             <a:endParaRPr lang="en-FI"/>
           </a:p>
@@ -2696,7 +2151,7 @@
           <a:p>
             <a:fld id="{75D0A277-1334-4236-85D9-B2D317AA20BB}" type="datetimeFigureOut">
               <a:rPr lang="en-FI" smtClean="0"/>
-              <a:t>09/03/2024</a:t>
+              <a:t>15/03/2024</a:t>
             </a:fld>
             <a:endParaRPr lang="en-FI"/>
           </a:p>
@@ -2953,7 +2408,7 @@
           <a:p>
             <a:fld id="{75D0A277-1334-4236-85D9-B2D317AA20BB}" type="datetimeFigureOut">
               <a:rPr lang="en-FI" smtClean="0"/>
-              <a:t>09/03/2024</a:t>
+              <a:t>15/03/2024</a:t>
             </a:fld>
             <a:endParaRPr lang="en-FI"/>
           </a:p>
@@ -3166,7 +2621,7 @@
           <a:p>
             <a:fld id="{75D0A277-1334-4236-85D9-B2D317AA20BB}" type="datetimeFigureOut">
               <a:rPr lang="en-FI" smtClean="0"/>
-              <a:t>09/03/2024</a:t>
+              <a:t>15/03/2024</a:t>
             </a:fld>
             <a:endParaRPr lang="en-FI"/>
           </a:p>
@@ -3555,8 +3010,18 @@
 </file>
 
 <file path=ppt/slides/slide1.xml><?xml version="1.0" encoding="utf-8"?>
-<p:sld xmlns:a="http://schemas.openxmlformats.org/drawingml/2006/main" xmlns:r="http://schemas.openxmlformats.org/officeDocument/2006/relationships" xmlns:p="http://schemas.openxmlformats.org/presentationml/2006/main" showMasterSp="0">
+<p:sld xmlns:a="http://schemas.openxmlformats.org/drawingml/2006/main" xmlns:r="http://schemas.openxmlformats.org/officeDocument/2006/relationships" xmlns:p="http://schemas.openxmlformats.org/presentationml/2006/main">
   <p:cSld>
+    <p:bg>
+      <p:bgPr>
+        <a:solidFill>
+          <a:schemeClr val="accent1">
+            <a:alpha val="0"/>
+          </a:schemeClr>
+        </a:solidFill>
+        <a:effectLst/>
+      </p:bgPr>
+    </p:bg>
     <p:spTree>
       <p:nvGrpSpPr>
         <p:cNvPr id="1" name=""/>
@@ -3571,45 +3036,6 @@
           <a:chExt cx="0" cy="0"/>
         </a:xfrm>
       </p:grpSpPr>
-      <p:pic>
-        <p:nvPicPr>
-          <p:cNvPr id="8" name="Graphic 7">
-            <a:extLst>
-              <a:ext uri="{FF2B5EF4-FFF2-40B4-BE49-F238E27FC236}">
-                <a16:creationId xmlns:a16="http://schemas.microsoft.com/office/drawing/2014/main" id="{C8C7D250-F7FA-F5AD-F725-AF2E29BC85E5}"/>
-              </a:ext>
-            </a:extLst>
-          </p:cNvPr>
-          <p:cNvPicPr>
-            <a:picLocks noChangeAspect="1"/>
-          </p:cNvPicPr>
-          <p:nvPr/>
-        </p:nvPicPr>
-        <p:blipFill>
-          <a:blip r:embed="rId2">
-            <a:extLst>
-              <a:ext uri="{28A0092B-C50C-407E-A947-70E740481C1C}">
-                <a14:useLocalDpi xmlns:a14="http://schemas.microsoft.com/office/drawing/2010/main" val="0"/>
-              </a:ext>
-              <a:ext uri="{96DAC541-7B7A-43D3-8B79-37D633B846F1}">
-                <asvg:svgBlip xmlns:asvg="http://schemas.microsoft.com/office/drawing/2016/SVG/main" r:embed="rId3"/>
-              </a:ext>
-            </a:extLst>
-          </a:blip>
-          <a:stretch>
-            <a:fillRect/>
-          </a:stretch>
-        </p:blipFill>
-        <p:spPr>
-          <a:xfrm>
-            <a:off x="0" y="0"/>
-            <a:ext cx="3240088" cy="3240088"/>
-          </a:xfrm>
-          <a:prstGeom prst="rect">
-            <a:avLst/>
-          </a:prstGeom>
-        </p:spPr>
-      </p:pic>
       <p:grpSp>
         <p:nvGrpSpPr>
           <p:cNvPr id="38" name="Group 37">
@@ -3624,10 +3050,10 @@
         </p:nvGrpSpPr>
         <p:grpSpPr>
           <a:xfrm>
-            <a:off x="2523952" y="126788"/>
-            <a:ext cx="6795089" cy="2799871"/>
-            <a:chOff x="2523951" y="306968"/>
-            <a:chExt cx="6795089" cy="2799872"/>
+            <a:off x="2520777" y="126788"/>
+            <a:ext cx="6795089" cy="2778867"/>
+            <a:chOff x="2523951" y="345068"/>
+            <a:chExt cx="6795089" cy="2778868"/>
           </a:xfrm>
         </p:grpSpPr>
         <p:sp>
@@ -3646,7 +3072,7 @@
           </p:nvSpPr>
           <p:spPr bwMode="auto">
             <a:xfrm>
-              <a:off x="2523951" y="306968"/>
+              <a:off x="2523951" y="345068"/>
               <a:ext cx="6795089" cy="2182153"/>
             </a:xfrm>
             <a:prstGeom prst="rect">
@@ -3733,8 +3159,8 @@
           </p:nvSpPr>
           <p:spPr bwMode="auto">
             <a:xfrm>
-              <a:off x="3829050" y="2325831"/>
-              <a:ext cx="5295900" cy="781009"/>
+              <a:off x="2776855" y="2342927"/>
+              <a:ext cx="6408420" cy="781009"/>
             </a:xfrm>
             <a:prstGeom prst="rect">
               <a:avLst/>
@@ -3790,25 +3216,64 @@
                 </a:spcAft>
               </a:pPr>
               <a:r>
-                <a:rPr lang="en-FI" altLang="en-FI" sz="6000" i="1" dirty="0">
+                <a:rPr lang="en-FI" altLang="en-FI" sz="7600" b="1" i="1" dirty="0" err="1">
                   <a:solidFill>
                     <a:srgbClr val="4D4D4D"/>
                   </a:solidFill>
-                  <a:latin typeface="Calibri" panose="020F0502020204030204" pitchFamily="34" charset="0"/>
+                  <a:latin typeface="Ubuntu" panose="020B0504030602030204" pitchFamily="34" charset="0"/>
                 </a:rPr>
-                <a:t>SALAMAVERKKO</a:t>
+                <a:t>salamaverkko</a:t>
               </a:r>
-              <a:endParaRPr lang="en-FI" altLang="en-FI" sz="6000" dirty="0">
-                <a:latin typeface="Arial" panose="020B0604020202020204" pitchFamily="34" charset="0"/>
+              <a:endParaRPr lang="en-FI" altLang="en-FI" sz="7600" b="1" dirty="0">
+                <a:latin typeface="Ubuntu" panose="020B0504030602030204" pitchFamily="34" charset="0"/>
               </a:endParaRPr>
             </a:p>
           </p:txBody>
         </p:sp>
       </p:grpSp>
+      <p:pic>
+        <p:nvPicPr>
+          <p:cNvPr id="5" name="Graphic 4">
+            <a:extLst>
+              <a:ext uri="{FF2B5EF4-FFF2-40B4-BE49-F238E27FC236}">
+                <a16:creationId xmlns:a16="http://schemas.microsoft.com/office/drawing/2014/main" id="{72D4F2BF-45F1-F1D5-A779-2C48D034B8A8}"/>
+              </a:ext>
+            </a:extLst>
+          </p:cNvPr>
+          <p:cNvPicPr>
+            <a:picLocks noChangeAspect="1"/>
+          </p:cNvPicPr>
+          <p:nvPr/>
+        </p:nvPicPr>
+        <p:blipFill>
+          <a:blip r:embed="rId2">
+            <a:extLst>
+              <a:ext uri="{28A0092B-C50C-407E-A947-70E740481C1C}">
+                <a14:useLocalDpi xmlns:a14="http://schemas.microsoft.com/office/drawing/2010/main" val="0"/>
+              </a:ext>
+              <a:ext uri="{96DAC541-7B7A-43D3-8B79-37D633B846F1}">
+                <asvg:svgBlip xmlns:asvg="http://schemas.microsoft.com/office/drawing/2016/SVG/main" r:embed="rId3"/>
+              </a:ext>
+            </a:extLst>
+          </a:blip>
+          <a:stretch>
+            <a:fillRect/>
+          </a:stretch>
+        </p:blipFill>
+        <p:spPr>
+          <a:xfrm>
+            <a:off x="0" y="0"/>
+            <a:ext cx="3054350" cy="3054350"/>
+          </a:xfrm>
+          <a:prstGeom prst="rect">
+            <a:avLst/>
+          </a:prstGeom>
+        </p:spPr>
+      </p:pic>
     </p:spTree>
     <p:extLst>
       <p:ext uri="{BB962C8B-B14F-4D97-AF65-F5344CB8AC3E}">
-        <p14:creationId xmlns:p14="http://schemas.microsoft.com/office/powerpoint/2010/main" val="560821162"/>
+        <p14:creationId xmlns:p14="http://schemas.microsoft.com/office/powerpoint/2010/main" val="110841472"/>
       </p:ext>
     </p:extLst>
   </p:cSld>

</xml_diff>